<commit_message>
Added Announcements, one slide on Scanner and Code Along practice at the end
Added Announcements, one slide on Scanner and Code Along practice at the end
</commit_message>
<xml_diff>
--- a/slides/On-Campus/07_02_FileInput.pptx
+++ b/slides/On-Campus/07_02_FileInput.pptx
@@ -5,19 +5,22 @@
     <p:sldMasterId id="2147483648" r:id="rId1"/>
   </p:sldMasterIdLst>
   <p:notesMasterIdLst>
-    <p:notesMasterId r:id="rId9"/>
+    <p:notesMasterId r:id="rId12"/>
   </p:notesMasterIdLst>
   <p:handoutMasterIdLst>
-    <p:handoutMasterId r:id="rId10"/>
+    <p:handoutMasterId r:id="rId13"/>
   </p:handoutMasterIdLst>
   <p:sldIdLst>
     <p:sldId id="256" r:id="rId2"/>
-    <p:sldId id="257" r:id="rId3"/>
-    <p:sldId id="258" r:id="rId4"/>
-    <p:sldId id="259" r:id="rId5"/>
-    <p:sldId id="260" r:id="rId6"/>
-    <p:sldId id="261" r:id="rId7"/>
-    <p:sldId id="262" r:id="rId8"/>
+    <p:sldId id="266" r:id="rId3"/>
+    <p:sldId id="264" r:id="rId4"/>
+    <p:sldId id="257" r:id="rId5"/>
+    <p:sldId id="258" r:id="rId6"/>
+    <p:sldId id="259" r:id="rId7"/>
+    <p:sldId id="260" r:id="rId8"/>
+    <p:sldId id="261" r:id="rId9"/>
+    <p:sldId id="262" r:id="rId10"/>
+    <p:sldId id="263" r:id="rId11"/>
   </p:sldIdLst>
   <p:sldSz cx="13817600" cy="7772400"/>
   <p:notesSz cx="6858000" cy="9144000"/>
@@ -138,6 +141,198 @@
 </p:presentation>
 </file>
 
+<file path=ppt/changesInfos/changesInfo1.xml><?xml version="1.0" encoding="utf-8"?>
+<pc:chgInfo xmlns:a="http://schemas.openxmlformats.org/drawingml/2006/main" xmlns:r="http://schemas.openxmlformats.org/officeDocument/2006/relationships" xmlns:ac="http://schemas.microsoft.com/office/drawing/2013/main/command" xmlns:pc="http://schemas.microsoft.com/office/powerpoint/2013/main/command">
+  <pc:docChgLst>
+    <pc:chgData name="Marcia Moraes" userId="c9c67e8a-58e2-4733-9a1c-5d44fec4775b" providerId="ADAL" clId="{B802DB61-6500-4EC4-9751-98CA970A2D47}"/>
+    <pc:docChg chg="undo custSel addSld modSld">
+      <pc:chgData name="Marcia Moraes" userId="c9c67e8a-58e2-4733-9a1c-5d44fec4775b" providerId="ADAL" clId="{B802DB61-6500-4EC4-9751-98CA970A2D47}" dt="2021-10-05T16:00:22.289" v="1228"/>
+      <pc:docMkLst>
+        <pc:docMk/>
+      </pc:docMkLst>
+      <pc:sldChg chg="modSp">
+        <pc:chgData name="Marcia Moraes" userId="c9c67e8a-58e2-4733-9a1c-5d44fec4775b" providerId="ADAL" clId="{B802DB61-6500-4EC4-9751-98CA970A2D47}" dt="2021-10-05T01:34:47.620" v="496" actId="15"/>
+        <pc:sldMkLst>
+          <pc:docMk/>
+          <pc:sldMk cId="1620380962" sldId="257"/>
+        </pc:sldMkLst>
+        <pc:spChg chg="mod">
+          <ac:chgData name="Marcia Moraes" userId="c9c67e8a-58e2-4733-9a1c-5d44fec4775b" providerId="ADAL" clId="{B802DB61-6500-4EC4-9751-98CA970A2D47}" dt="2021-10-05T01:34:47.620" v="496" actId="15"/>
+          <ac:spMkLst>
+            <pc:docMk/>
+            <pc:sldMk cId="1620380962" sldId="257"/>
+            <ac:spMk id="5" creationId="{B14CD88C-B718-634B-8318-80188AABD775}"/>
+          </ac:spMkLst>
+        </pc:spChg>
+      </pc:sldChg>
+      <pc:sldChg chg="modSp">
+        <pc:chgData name="Marcia Moraes" userId="c9c67e8a-58e2-4733-9a1c-5d44fec4775b" providerId="ADAL" clId="{B802DB61-6500-4EC4-9751-98CA970A2D47}" dt="2021-10-05T02:46:51.481" v="504" actId="20577"/>
+        <pc:sldMkLst>
+          <pc:docMk/>
+          <pc:sldMk cId="2845291675" sldId="258"/>
+        </pc:sldMkLst>
+        <pc:spChg chg="mod">
+          <ac:chgData name="Marcia Moraes" userId="c9c67e8a-58e2-4733-9a1c-5d44fec4775b" providerId="ADAL" clId="{B802DB61-6500-4EC4-9751-98CA970A2D47}" dt="2021-10-05T02:46:51.481" v="504" actId="20577"/>
+          <ac:spMkLst>
+            <pc:docMk/>
+            <pc:sldMk cId="2845291675" sldId="258"/>
+            <ac:spMk id="3" creationId="{47162931-48BA-F74D-8467-8A30C04935D9}"/>
+          </ac:spMkLst>
+        </pc:spChg>
+      </pc:sldChg>
+      <pc:sldChg chg="modSp">
+        <pc:chgData name="Marcia Moraes" userId="c9c67e8a-58e2-4733-9a1c-5d44fec4775b" providerId="ADAL" clId="{B802DB61-6500-4EC4-9751-98CA970A2D47}" dt="2021-10-05T01:35:40.304" v="498" actId="14100"/>
+        <pc:sldMkLst>
+          <pc:docMk/>
+          <pc:sldMk cId="4232400343" sldId="261"/>
+        </pc:sldMkLst>
+        <pc:spChg chg="mod">
+          <ac:chgData name="Marcia Moraes" userId="c9c67e8a-58e2-4733-9a1c-5d44fec4775b" providerId="ADAL" clId="{B802DB61-6500-4EC4-9751-98CA970A2D47}" dt="2021-10-05T01:35:40.304" v="498" actId="14100"/>
+          <ac:spMkLst>
+            <pc:docMk/>
+            <pc:sldMk cId="4232400343" sldId="261"/>
+            <ac:spMk id="4" creationId="{88D97854-925B-D645-9802-4AA257AFFC1D}"/>
+          </ac:spMkLst>
+        </pc:spChg>
+      </pc:sldChg>
+      <pc:sldChg chg="addSp delSp modSp add">
+        <pc:chgData name="Marcia Moraes" userId="c9c67e8a-58e2-4733-9a1c-5d44fec4775b" providerId="ADAL" clId="{B802DB61-6500-4EC4-9751-98CA970A2D47}" dt="2021-10-05T14:58:02.999" v="1102" actId="20577"/>
+        <pc:sldMkLst>
+          <pc:docMk/>
+          <pc:sldMk cId="1476890346" sldId="263"/>
+        </pc:sldMkLst>
+        <pc:spChg chg="mod">
+          <ac:chgData name="Marcia Moraes" userId="c9c67e8a-58e2-4733-9a1c-5d44fec4775b" providerId="ADAL" clId="{B802DB61-6500-4EC4-9751-98CA970A2D47}" dt="2021-10-05T14:49:57.028" v="532" actId="20577"/>
+          <ac:spMkLst>
+            <pc:docMk/>
+            <pc:sldMk cId="1476890346" sldId="263"/>
+            <ac:spMk id="2" creationId="{FC334E8A-B8C7-EC49-A694-7AA4D3D504FD}"/>
+          </ac:spMkLst>
+        </pc:spChg>
+        <pc:spChg chg="add del mod">
+          <ac:chgData name="Marcia Moraes" userId="c9c67e8a-58e2-4733-9a1c-5d44fec4775b" providerId="ADAL" clId="{B802DB61-6500-4EC4-9751-98CA970A2D47}" dt="2021-10-05T14:50:26.239" v="536"/>
+          <ac:spMkLst>
+            <pc:docMk/>
+            <pc:sldMk cId="1476890346" sldId="263"/>
+            <ac:spMk id="3" creationId="{2B14DF66-1C11-4282-B297-925D7A2C7F1B}"/>
+          </ac:spMkLst>
+        </pc:spChg>
+        <pc:spChg chg="del">
+          <ac:chgData name="Marcia Moraes" userId="c9c67e8a-58e2-4733-9a1c-5d44fec4775b" providerId="ADAL" clId="{B802DB61-6500-4EC4-9751-98CA970A2D47}" dt="2021-10-05T14:40:12.576" v="505" actId="478"/>
+          <ac:spMkLst>
+            <pc:docMk/>
+            <pc:sldMk cId="1476890346" sldId="263"/>
+            <ac:spMk id="4" creationId="{0B7BB643-CC13-5F48-B7D6-FDE4A1E7E2C9}"/>
+          </ac:spMkLst>
+        </pc:spChg>
+        <pc:spChg chg="del">
+          <ac:chgData name="Marcia Moraes" userId="c9c67e8a-58e2-4733-9a1c-5d44fec4775b" providerId="ADAL" clId="{B802DB61-6500-4EC4-9751-98CA970A2D47}" dt="2021-10-05T14:40:14.592" v="506" actId="478"/>
+          <ac:spMkLst>
+            <pc:docMk/>
+            <pc:sldMk cId="1476890346" sldId="263"/>
+            <ac:spMk id="5" creationId="{9BF04A02-6B5E-194B-8FAD-764A48E18EA4}"/>
+          </ac:spMkLst>
+        </pc:spChg>
+        <pc:spChg chg="add mod">
+          <ac:chgData name="Marcia Moraes" userId="c9c67e8a-58e2-4733-9a1c-5d44fec4775b" providerId="ADAL" clId="{B802DB61-6500-4EC4-9751-98CA970A2D47}" dt="2021-10-05T14:58:02.999" v="1102" actId="20577"/>
+          <ac:spMkLst>
+            <pc:docMk/>
+            <pc:sldMk cId="1476890346" sldId="263"/>
+            <ac:spMk id="6" creationId="{E9832979-4813-46BF-A325-4E6241C85E30}"/>
+          </ac:spMkLst>
+        </pc:spChg>
+        <pc:spChg chg="add del">
+          <ac:chgData name="Marcia Moraes" userId="c9c67e8a-58e2-4733-9a1c-5d44fec4775b" providerId="ADAL" clId="{B802DB61-6500-4EC4-9751-98CA970A2D47}" dt="2021-10-05T14:54:45.850" v="926"/>
+          <ac:spMkLst>
+            <pc:docMk/>
+            <pc:sldMk cId="1476890346" sldId="263"/>
+            <ac:spMk id="9" creationId="{836FE836-D84E-4DA7-8699-98CDB90637B5}"/>
+          </ac:spMkLst>
+        </pc:spChg>
+        <pc:spChg chg="add del">
+          <ac:chgData name="Marcia Moraes" userId="c9c67e8a-58e2-4733-9a1c-5d44fec4775b" providerId="ADAL" clId="{B802DB61-6500-4EC4-9751-98CA970A2D47}" dt="2021-10-05T14:55:27.705" v="945"/>
+          <ac:spMkLst>
+            <pc:docMk/>
+            <pc:sldMk cId="1476890346" sldId="263"/>
+            <ac:spMk id="10" creationId="{892FFA47-402C-4E87-93B0-D834369DA762}"/>
+          </ac:spMkLst>
+        </pc:spChg>
+        <pc:picChg chg="add del mod">
+          <ac:chgData name="Marcia Moraes" userId="c9c67e8a-58e2-4733-9a1c-5d44fec4775b" providerId="ADAL" clId="{B802DB61-6500-4EC4-9751-98CA970A2D47}" dt="2021-10-05T14:53:17.881" v="919" actId="478"/>
+          <ac:picMkLst>
+            <pc:docMk/>
+            <pc:sldMk cId="1476890346" sldId="263"/>
+            <ac:picMk id="7" creationId="{5D4E4AAD-012D-4BDB-BEBB-B4E0524F3A25}"/>
+          </ac:picMkLst>
+        </pc:picChg>
+        <pc:picChg chg="add mod">
+          <ac:chgData name="Marcia Moraes" userId="c9c67e8a-58e2-4733-9a1c-5d44fec4775b" providerId="ADAL" clId="{B802DB61-6500-4EC4-9751-98CA970A2D47}" dt="2021-10-05T14:54:03.049" v="923" actId="14100"/>
+          <ac:picMkLst>
+            <pc:docMk/>
+            <pc:sldMk cId="1476890346" sldId="263"/>
+            <ac:picMk id="8" creationId="{15FE55B2-6626-4E62-86A0-5E93D9D51CBC}"/>
+          </ac:picMkLst>
+        </pc:picChg>
+      </pc:sldChg>
+      <pc:sldChg chg="modSp add">
+        <pc:chgData name="Marcia Moraes" userId="c9c67e8a-58e2-4733-9a1c-5d44fec4775b" providerId="ADAL" clId="{B802DB61-6500-4EC4-9751-98CA970A2D47}" dt="2021-10-05T01:34:16.728" v="493" actId="20577"/>
+        <pc:sldMkLst>
+          <pc:docMk/>
+          <pc:sldMk cId="1011463358" sldId="264"/>
+        </pc:sldMkLst>
+        <pc:spChg chg="mod">
+          <ac:chgData name="Marcia Moraes" userId="c9c67e8a-58e2-4733-9a1c-5d44fec4775b" providerId="ADAL" clId="{B802DB61-6500-4EC4-9751-98CA970A2D47}" dt="2021-10-05T01:27:14.048" v="28" actId="20577"/>
+          <ac:spMkLst>
+            <pc:docMk/>
+            <pc:sldMk cId="1011463358" sldId="264"/>
+            <ac:spMk id="4" creationId="{683FFEF0-EAC6-454C-9E58-568E0B3AD6FB}"/>
+          </ac:spMkLst>
+        </pc:spChg>
+        <pc:spChg chg="mod">
+          <ac:chgData name="Marcia Moraes" userId="c9c67e8a-58e2-4733-9a1c-5d44fec4775b" providerId="ADAL" clId="{B802DB61-6500-4EC4-9751-98CA970A2D47}" dt="2021-10-05T01:34:16.728" v="493" actId="20577"/>
+          <ac:spMkLst>
+            <pc:docMk/>
+            <pc:sldMk cId="1011463358" sldId="264"/>
+            <ac:spMk id="5" creationId="{B14CD88C-B718-634B-8318-80188AABD775}"/>
+          </ac:spMkLst>
+        </pc:spChg>
+      </pc:sldChg>
+      <pc:sldChg chg="addSp delSp modSp add">
+        <pc:chgData name="Marcia Moraes" userId="c9c67e8a-58e2-4733-9a1c-5d44fec4775b" providerId="ADAL" clId="{B802DB61-6500-4EC4-9751-98CA970A2D47}" dt="2021-10-05T16:00:22.289" v="1228"/>
+        <pc:sldMkLst>
+          <pc:docMk/>
+          <pc:sldMk cId="926474781" sldId="266"/>
+        </pc:sldMkLst>
+        <pc:spChg chg="del mod">
+          <ac:chgData name="Marcia Moraes" userId="c9c67e8a-58e2-4733-9a1c-5d44fec4775b" providerId="ADAL" clId="{B802DB61-6500-4EC4-9751-98CA970A2D47}" dt="2021-10-05T16:00:22.289" v="1228"/>
+          <ac:spMkLst>
+            <pc:docMk/>
+            <pc:sldMk cId="926474781" sldId="266"/>
+            <ac:spMk id="3" creationId="{219403AF-FCA0-4FAD-B2CD-E3D24CF8DD27}"/>
+          </ac:spMkLst>
+        </pc:spChg>
+        <pc:spChg chg="mod">
+          <ac:chgData name="Marcia Moraes" userId="c9c67e8a-58e2-4733-9a1c-5d44fec4775b" providerId="ADAL" clId="{B802DB61-6500-4EC4-9751-98CA970A2D47}" dt="2021-10-05T15:54:25.917" v="1224" actId="20577"/>
+          <ac:spMkLst>
+            <pc:docMk/>
+            <pc:sldMk cId="926474781" sldId="266"/>
+            <ac:spMk id="7" creationId="{BF16D510-BC74-4FA5-AFD2-193B039115A5}"/>
+          </ac:spMkLst>
+        </pc:spChg>
+        <pc:spChg chg="add">
+          <ac:chgData name="Marcia Moraes" userId="c9c67e8a-58e2-4733-9a1c-5d44fec4775b" providerId="ADAL" clId="{B802DB61-6500-4EC4-9751-98CA970A2D47}" dt="2021-10-05T16:00:17.983" v="1227"/>
+          <ac:spMkLst>
+            <pc:docMk/>
+            <pc:sldMk cId="926474781" sldId="266"/>
+            <ac:spMk id="8" creationId="{880D349E-8851-40B5-BCF5-C016EA02C2A6}"/>
+          </ac:spMkLst>
+        </pc:spChg>
+      </pc:sldChg>
+    </pc:docChg>
+  </pc:docChgLst>
+</pc:chgInfo>
+</file>
+
 <file path=ppt/handoutMasters/handoutMaster1.xml><?xml version="1.0" encoding="utf-8"?>
 <p:handoutMaster xmlns:a="http://schemas.openxmlformats.org/drawingml/2006/main" xmlns:r="http://schemas.openxmlformats.org/officeDocument/2006/relationships" xmlns:p="http://schemas.openxmlformats.org/presentationml/2006/main">
   <p:cSld>
@@ -220,7 +415,7 @@
           <a:p>
             <a:fld id="{4D7E51A5-B478-1E40-8CBB-0DAA8831E99D}" type="datetimeFigureOut">
               <a:rPr lang="en-US" smtClean="0"/>
-              <a:t>4/11/20</a:t>
+              <a:t>10/4/2021</a:t>
             </a:fld>
             <a:endParaRPr lang="en-US"/>
           </a:p>
@@ -385,7 +580,7 @@
           <a:p>
             <a:fld id="{D0ED587F-861E-6740-9643-E3DDAE89B8D6}" type="datetimeFigureOut">
               <a:rPr lang="en-US" smtClean="0"/>
-              <a:t>4/11/20</a:t>
+              <a:t>10/4/2021</a:t>
             </a:fld>
             <a:endParaRPr lang="en-US"/>
           </a:p>
@@ -4012,6 +4207,602 @@
 </p:sldLayout>
 </file>
 
+<file path=ppt/slideLayouts/slideLayout25.xml><?xml version="1.0" encoding="utf-8"?>
+<p:sldLayout xmlns:a="http://schemas.openxmlformats.org/drawingml/2006/main" xmlns:r="http://schemas.openxmlformats.org/officeDocument/2006/relationships" xmlns:p="http://schemas.openxmlformats.org/presentationml/2006/main" matchingName="Title and Content">
+  <p:cSld name="1_Title and Content">
+    <p:spTree>
+      <p:nvGrpSpPr>
+        <p:cNvPr id="1" name="Shape 53"/>
+        <p:cNvGrpSpPr/>
+        <p:nvPr/>
+      </p:nvGrpSpPr>
+      <p:grpSpPr>
+        <a:xfrm>
+          <a:off x="0" y="0"/>
+          <a:ext cx="0" cy="0"/>
+          <a:chOff x="0" y="0"/>
+          <a:chExt cx="0" cy="0"/>
+        </a:xfrm>
+      </p:grpSpPr>
+      <p:grpSp>
+        <p:nvGrpSpPr>
+          <p:cNvPr id="54" name="Google Shape;54;p14"/>
+          <p:cNvGrpSpPr/>
+          <p:nvPr/>
+        </p:nvGrpSpPr>
+        <p:grpSpPr>
+          <a:xfrm>
+            <a:off x="0" y="7372875"/>
+            <a:ext cx="13849756" cy="400074"/>
+            <a:chOff x="0" y="7372350"/>
+            <a:chExt cx="13817700" cy="400053"/>
+          </a:xfrm>
+        </p:grpSpPr>
+        <p:sp>
+          <p:nvSpPr>
+            <p:cNvPr id="55" name="Google Shape;55;p14"/>
+            <p:cNvSpPr/>
+            <p:nvPr/>
+          </p:nvSpPr>
+          <p:spPr>
+            <a:xfrm>
+              <a:off x="0" y="7372350"/>
+              <a:ext cx="13817700" cy="399900"/>
+            </a:xfrm>
+            <a:prstGeom prst="rect">
+              <a:avLst/>
+            </a:prstGeom>
+            <a:solidFill>
+              <a:schemeClr val="dk2"/>
+            </a:solidFill>
+            <a:ln>
+              <a:noFill/>
+            </a:ln>
+          </p:spPr>
+          <p:txBody>
+            <a:bodyPr spcFirstLastPara="1" wrap="square" lIns="60500" tIns="30250" rIns="60500" bIns="30250" anchor="ctr" anchorCtr="0">
+              <a:noAutofit/>
+            </a:bodyPr>
+            <a:lstStyle/>
+            <a:p>
+              <a:pPr marL="0" marR="0" lvl="0" indent="0" algn="ctr" rtl="0">
+                <a:spcBef>
+                  <a:spcPts val="0"/>
+                </a:spcBef>
+                <a:spcAft>
+                  <a:spcPts val="0"/>
+                </a:spcAft>
+                <a:buNone/>
+              </a:pPr>
+              <a:endParaRPr sz="1964" b="0" i="0" u="none" strike="noStrike" cap="none">
+                <a:solidFill>
+                  <a:schemeClr val="lt1"/>
+                </a:solidFill>
+                <a:latin typeface="Arial"/>
+                <a:ea typeface="Arial"/>
+                <a:cs typeface="Arial"/>
+                <a:sym typeface="Arial"/>
+              </a:endParaRPr>
+            </a:p>
+          </p:txBody>
+        </p:sp>
+        <p:pic>
+          <p:nvPicPr>
+            <p:cNvPr id="56" name="Google Shape;56;p14"/>
+            <p:cNvPicPr preferRelativeResize="0"/>
+            <p:nvPr/>
+          </p:nvPicPr>
+          <p:blipFill rotWithShape="1">
+            <a:blip r:embed="rId2">
+              <a:alphaModFix/>
+            </a:blip>
+            <a:srcRect/>
+            <a:stretch/>
+          </p:blipFill>
+          <p:spPr>
+            <a:xfrm>
+              <a:off x="152257" y="7372351"/>
+              <a:ext cx="1788558" cy="400050"/>
+            </a:xfrm>
+            <a:prstGeom prst="rect">
+              <a:avLst/>
+            </a:prstGeom>
+            <a:noFill/>
+            <a:ln>
+              <a:noFill/>
+            </a:ln>
+          </p:spPr>
+        </p:pic>
+        <p:sp>
+          <p:nvSpPr>
+            <p:cNvPr id="57" name="Google Shape;57;p14"/>
+            <p:cNvSpPr/>
+            <p:nvPr/>
+          </p:nvSpPr>
+          <p:spPr>
+            <a:xfrm>
+              <a:off x="0" y="7372351"/>
+              <a:ext cx="13817700" cy="399900"/>
+            </a:xfrm>
+            <a:prstGeom prst="rect">
+              <a:avLst/>
+            </a:prstGeom>
+            <a:solidFill>
+              <a:schemeClr val="dk2"/>
+            </a:solidFill>
+            <a:ln>
+              <a:noFill/>
+            </a:ln>
+          </p:spPr>
+          <p:txBody>
+            <a:bodyPr spcFirstLastPara="1" wrap="square" lIns="60500" tIns="30250" rIns="60500" bIns="30250" anchor="ctr" anchorCtr="0">
+              <a:noAutofit/>
+            </a:bodyPr>
+            <a:lstStyle/>
+            <a:p>
+              <a:pPr marL="0" marR="0" lvl="0" indent="0" algn="ctr" rtl="0">
+                <a:spcBef>
+                  <a:spcPts val="0"/>
+                </a:spcBef>
+                <a:spcAft>
+                  <a:spcPts val="0"/>
+                </a:spcAft>
+                <a:buNone/>
+              </a:pPr>
+              <a:endParaRPr sz="1964" b="0" i="0" u="none" strike="noStrike" cap="none">
+                <a:solidFill>
+                  <a:schemeClr val="lt1"/>
+                </a:solidFill>
+                <a:latin typeface="Arial"/>
+                <a:ea typeface="Arial"/>
+                <a:cs typeface="Arial"/>
+                <a:sym typeface="Arial"/>
+              </a:endParaRPr>
+            </a:p>
+          </p:txBody>
+        </p:sp>
+        <p:pic>
+          <p:nvPicPr>
+            <p:cNvPr id="58" name="Google Shape;58;p14"/>
+            <p:cNvPicPr preferRelativeResize="0"/>
+            <p:nvPr/>
+          </p:nvPicPr>
+          <p:blipFill rotWithShape="1">
+            <a:blip r:embed="rId2">
+              <a:alphaModFix/>
+            </a:blip>
+            <a:srcRect/>
+            <a:stretch/>
+          </p:blipFill>
+          <p:spPr>
+            <a:xfrm>
+              <a:off x="152257" y="7372352"/>
+              <a:ext cx="1788558" cy="400050"/>
+            </a:xfrm>
+            <a:prstGeom prst="rect">
+              <a:avLst/>
+            </a:prstGeom>
+            <a:noFill/>
+            <a:ln>
+              <a:noFill/>
+            </a:ln>
+          </p:spPr>
+        </p:pic>
+      </p:grpSp>
+      <p:sp>
+        <p:nvSpPr>
+          <p:cNvPr id="59" name="Google Shape;59;p14"/>
+          <p:cNvSpPr txBox="1">
+            <a:spLocks noGrp="1"/>
+          </p:cNvSpPr>
+          <p:nvPr>
+            <p:ph type="title"/>
+          </p:nvPr>
+        </p:nvSpPr>
+        <p:spPr>
+          <a:xfrm>
+            <a:off x="628075" y="905258"/>
+            <a:ext cx="12561413" cy="1015467"/>
+          </a:xfrm>
+          <a:prstGeom prst="rect">
+            <a:avLst/>
+          </a:prstGeom>
+          <a:noFill/>
+          <a:ln>
+            <a:noFill/>
+          </a:ln>
+        </p:spPr>
+        <p:txBody>
+          <a:bodyPr spcFirstLastPara="1" wrap="square" lIns="60500" tIns="60500" rIns="60500" bIns="60500" anchor="b" anchorCtr="0">
+            <a:noAutofit/>
+          </a:bodyPr>
+          <a:lstStyle>
+            <a:lvl1pPr marR="0" lvl="0" algn="l" rtl="0">
+              <a:spcBef>
+                <a:spcPts val="0"/>
+              </a:spcBef>
+              <a:spcAft>
+                <a:spcPts val="0"/>
+              </a:spcAft>
+              <a:buClr>
+                <a:schemeClr val="dk2"/>
+              </a:buClr>
+              <a:buSzPts val="3600"/>
+              <a:buFont typeface="Arial"/>
+              <a:buNone/>
+              <a:defRPr sz="5440" b="0" i="0" u="none" strike="noStrike" cap="none">
+                <a:solidFill>
+                  <a:schemeClr val="dk2"/>
+                </a:solidFill>
+                <a:latin typeface="Arial"/>
+                <a:ea typeface="Arial"/>
+                <a:cs typeface="Arial"/>
+                <a:sym typeface="Arial"/>
+              </a:defRPr>
+            </a:lvl1pPr>
+            <a:lvl2pPr lvl="1" rtl="0">
+              <a:spcBef>
+                <a:spcPts val="0"/>
+              </a:spcBef>
+              <a:spcAft>
+                <a:spcPts val="0"/>
+              </a:spcAft>
+              <a:buSzPts val="900"/>
+              <a:buNone/>
+              <a:defRPr sz="1813"/>
+            </a:lvl2pPr>
+            <a:lvl3pPr lvl="2" rtl="0">
+              <a:spcBef>
+                <a:spcPts val="0"/>
+              </a:spcBef>
+              <a:spcAft>
+                <a:spcPts val="0"/>
+              </a:spcAft>
+              <a:buSzPts val="900"/>
+              <a:buNone/>
+              <a:defRPr sz="1813"/>
+            </a:lvl3pPr>
+            <a:lvl4pPr lvl="3" rtl="0">
+              <a:spcBef>
+                <a:spcPts val="0"/>
+              </a:spcBef>
+              <a:spcAft>
+                <a:spcPts val="0"/>
+              </a:spcAft>
+              <a:buSzPts val="900"/>
+              <a:buNone/>
+              <a:defRPr sz="1813"/>
+            </a:lvl4pPr>
+            <a:lvl5pPr lvl="4" rtl="0">
+              <a:spcBef>
+                <a:spcPts val="0"/>
+              </a:spcBef>
+              <a:spcAft>
+                <a:spcPts val="0"/>
+              </a:spcAft>
+              <a:buSzPts val="900"/>
+              <a:buNone/>
+              <a:defRPr sz="1813"/>
+            </a:lvl5pPr>
+            <a:lvl6pPr lvl="5" rtl="0">
+              <a:spcBef>
+                <a:spcPts val="0"/>
+              </a:spcBef>
+              <a:spcAft>
+                <a:spcPts val="0"/>
+              </a:spcAft>
+              <a:buSzPts val="900"/>
+              <a:buNone/>
+              <a:defRPr sz="1813"/>
+            </a:lvl6pPr>
+            <a:lvl7pPr lvl="6" rtl="0">
+              <a:spcBef>
+                <a:spcPts val="0"/>
+              </a:spcBef>
+              <a:spcAft>
+                <a:spcPts val="0"/>
+              </a:spcAft>
+              <a:buSzPts val="900"/>
+              <a:buNone/>
+              <a:defRPr sz="1813"/>
+            </a:lvl7pPr>
+            <a:lvl8pPr lvl="7" rtl="0">
+              <a:spcBef>
+                <a:spcPts val="0"/>
+              </a:spcBef>
+              <a:spcAft>
+                <a:spcPts val="0"/>
+              </a:spcAft>
+              <a:buSzPts val="900"/>
+              <a:buNone/>
+              <a:defRPr sz="1813"/>
+            </a:lvl8pPr>
+            <a:lvl9pPr lvl="8" rtl="0">
+              <a:spcBef>
+                <a:spcPts val="0"/>
+              </a:spcBef>
+              <a:spcAft>
+                <a:spcPts val="0"/>
+              </a:spcAft>
+              <a:buSzPts val="900"/>
+              <a:buNone/>
+              <a:defRPr sz="1813"/>
+            </a:lvl9pPr>
+          </a:lstStyle>
+          <a:p>
+            <a:endParaRPr/>
+          </a:p>
+        </p:txBody>
+      </p:sp>
+      <p:sp>
+        <p:nvSpPr>
+          <p:cNvPr id="60" name="Google Shape;60;p14"/>
+          <p:cNvSpPr txBox="1">
+            <a:spLocks noGrp="1"/>
+          </p:cNvSpPr>
+          <p:nvPr>
+            <p:ph type="body" idx="1"/>
+          </p:nvPr>
+        </p:nvSpPr>
+        <p:spPr>
+          <a:xfrm>
+            <a:off x="628075" y="2487883"/>
+            <a:ext cx="12561413" cy="2015520"/>
+          </a:xfrm>
+          <a:prstGeom prst="rect">
+            <a:avLst/>
+          </a:prstGeom>
+          <a:noFill/>
+          <a:ln>
+            <a:noFill/>
+          </a:ln>
+        </p:spPr>
+        <p:txBody>
+          <a:bodyPr spcFirstLastPara="1" wrap="square" lIns="60500" tIns="60500" rIns="60500" bIns="60500" anchor="t" anchorCtr="0">
+            <a:noAutofit/>
+          </a:bodyPr>
+          <a:lstStyle>
+            <a:lvl1pPr marL="690875" marR="0" lvl="0" indent="-460583" algn="l" rtl="0">
+              <a:lnSpc>
+                <a:spcPct val="120000"/>
+              </a:lnSpc>
+              <a:spcBef>
+                <a:spcPts val="604"/>
+              </a:spcBef>
+              <a:spcAft>
+                <a:spcPts val="0"/>
+              </a:spcAft>
+              <a:buClr>
+                <a:schemeClr val="dk1"/>
+              </a:buClr>
+              <a:buSzPts val="1200"/>
+              <a:buFont typeface="Arial"/>
+              <a:buChar char="•"/>
+              <a:defRPr sz="1813" b="0" i="0" u="none" strike="noStrike" cap="none">
+                <a:solidFill>
+                  <a:schemeClr val="dk1"/>
+                </a:solidFill>
+                <a:latin typeface="Proxima Nova"/>
+                <a:ea typeface="Proxima Nova"/>
+                <a:cs typeface="Proxima Nova"/>
+                <a:sym typeface="Proxima Nova"/>
+              </a:defRPr>
+            </a:lvl1pPr>
+            <a:lvl2pPr marL="1381750" marR="0" lvl="1" indent="-450988" algn="l" rtl="0">
+              <a:lnSpc>
+                <a:spcPct val="120000"/>
+              </a:lnSpc>
+              <a:spcBef>
+                <a:spcPts val="604"/>
+              </a:spcBef>
+              <a:spcAft>
+                <a:spcPts val="0"/>
+              </a:spcAft>
+              <a:buClr>
+                <a:schemeClr val="dk1"/>
+              </a:buClr>
+              <a:buSzPts val="1100"/>
+              <a:buFont typeface="Arial"/>
+              <a:buChar char="–"/>
+              <a:defRPr sz="1662" b="0" i="0" u="none" strike="noStrike" cap="none">
+                <a:solidFill>
+                  <a:schemeClr val="dk1"/>
+                </a:solidFill>
+                <a:latin typeface="Proxima Nova"/>
+                <a:ea typeface="Proxima Nova"/>
+                <a:cs typeface="Proxima Nova"/>
+                <a:sym typeface="Proxima Nova"/>
+              </a:defRPr>
+            </a:lvl2pPr>
+            <a:lvl3pPr marL="2072625" marR="0" lvl="2" indent="-450988" algn="l" rtl="0">
+              <a:lnSpc>
+                <a:spcPct val="120000"/>
+              </a:lnSpc>
+              <a:spcBef>
+                <a:spcPts val="604"/>
+              </a:spcBef>
+              <a:spcAft>
+                <a:spcPts val="0"/>
+              </a:spcAft>
+              <a:buClr>
+                <a:schemeClr val="dk1"/>
+              </a:buClr>
+              <a:buSzPts val="1100"/>
+              <a:buFont typeface="Arial"/>
+              <a:buChar char="•"/>
+              <a:defRPr sz="1662" b="0" i="0" u="none" strike="noStrike" cap="none">
+                <a:solidFill>
+                  <a:schemeClr val="dk1"/>
+                </a:solidFill>
+                <a:latin typeface="Proxima Nova"/>
+                <a:ea typeface="Proxima Nova"/>
+                <a:cs typeface="Proxima Nova"/>
+                <a:sym typeface="Proxima Nova"/>
+              </a:defRPr>
+            </a:lvl3pPr>
+            <a:lvl4pPr marL="2763500" marR="0" lvl="3" indent="-450988" algn="l" rtl="0">
+              <a:lnSpc>
+                <a:spcPct val="120000"/>
+              </a:lnSpc>
+              <a:spcBef>
+                <a:spcPts val="604"/>
+              </a:spcBef>
+              <a:spcAft>
+                <a:spcPts val="0"/>
+              </a:spcAft>
+              <a:buClr>
+                <a:schemeClr val="dk1"/>
+              </a:buClr>
+              <a:buSzPts val="1100"/>
+              <a:buFont typeface="Arial"/>
+              <a:buChar char="–"/>
+              <a:defRPr sz="1662" b="0" i="0" u="none" strike="noStrike" cap="none">
+                <a:solidFill>
+                  <a:schemeClr val="dk1"/>
+                </a:solidFill>
+                <a:latin typeface="Proxima Nova"/>
+                <a:ea typeface="Proxima Nova"/>
+                <a:cs typeface="Proxima Nova"/>
+                <a:sym typeface="Proxima Nova"/>
+              </a:defRPr>
+            </a:lvl4pPr>
+            <a:lvl5pPr marL="3454375" marR="0" lvl="4" indent="-450988" algn="l" rtl="0">
+              <a:spcBef>
+                <a:spcPts val="604"/>
+              </a:spcBef>
+              <a:spcAft>
+                <a:spcPts val="0"/>
+              </a:spcAft>
+              <a:buClr>
+                <a:schemeClr val="dk1"/>
+              </a:buClr>
+              <a:buSzPts val="1100"/>
+              <a:buFont typeface="Arial"/>
+              <a:buChar char="»"/>
+              <a:defRPr sz="1662" b="0" i="0" u="none" strike="noStrike" cap="none">
+                <a:solidFill>
+                  <a:schemeClr val="dk1"/>
+                </a:solidFill>
+                <a:latin typeface="Source Sans Pro"/>
+                <a:ea typeface="Source Sans Pro"/>
+                <a:cs typeface="Source Sans Pro"/>
+                <a:sym typeface="Source Sans Pro"/>
+              </a:defRPr>
+            </a:lvl5pPr>
+            <a:lvl6pPr marL="4145250" marR="0" lvl="5" indent="-537347" algn="l" rtl="0">
+              <a:spcBef>
+                <a:spcPts val="604"/>
+              </a:spcBef>
+              <a:spcAft>
+                <a:spcPts val="0"/>
+              </a:spcAft>
+              <a:buClr>
+                <a:schemeClr val="dk1"/>
+              </a:buClr>
+              <a:buSzPts val="2000"/>
+              <a:buFont typeface="Arial"/>
+              <a:buChar char="•"/>
+              <a:defRPr sz="3022" b="0" i="0" u="none" strike="noStrike" cap="none">
+                <a:solidFill>
+                  <a:schemeClr val="dk1"/>
+                </a:solidFill>
+                <a:latin typeface="Arial"/>
+                <a:ea typeface="Arial"/>
+                <a:cs typeface="Arial"/>
+                <a:sym typeface="Arial"/>
+              </a:defRPr>
+            </a:lvl6pPr>
+            <a:lvl7pPr marL="4836124" marR="0" lvl="6" indent="-537347" algn="l" rtl="0">
+              <a:spcBef>
+                <a:spcPts val="604"/>
+              </a:spcBef>
+              <a:spcAft>
+                <a:spcPts val="0"/>
+              </a:spcAft>
+              <a:buClr>
+                <a:schemeClr val="dk1"/>
+              </a:buClr>
+              <a:buSzPts val="2000"/>
+              <a:buFont typeface="Arial"/>
+              <a:buChar char="•"/>
+              <a:defRPr sz="3022" b="0" i="0" u="none" strike="noStrike" cap="none">
+                <a:solidFill>
+                  <a:schemeClr val="dk1"/>
+                </a:solidFill>
+                <a:latin typeface="Arial"/>
+                <a:ea typeface="Arial"/>
+                <a:cs typeface="Arial"/>
+                <a:sym typeface="Arial"/>
+              </a:defRPr>
+            </a:lvl7pPr>
+            <a:lvl8pPr marL="5526999" marR="0" lvl="7" indent="-537347" algn="l" rtl="0">
+              <a:spcBef>
+                <a:spcPts val="604"/>
+              </a:spcBef>
+              <a:spcAft>
+                <a:spcPts val="0"/>
+              </a:spcAft>
+              <a:buClr>
+                <a:schemeClr val="dk1"/>
+              </a:buClr>
+              <a:buSzPts val="2000"/>
+              <a:buFont typeface="Arial"/>
+              <a:buChar char="•"/>
+              <a:defRPr sz="3022" b="0" i="0" u="none" strike="noStrike" cap="none">
+                <a:solidFill>
+                  <a:schemeClr val="dk1"/>
+                </a:solidFill>
+                <a:latin typeface="Arial"/>
+                <a:ea typeface="Arial"/>
+                <a:cs typeface="Arial"/>
+                <a:sym typeface="Arial"/>
+              </a:defRPr>
+            </a:lvl8pPr>
+            <a:lvl9pPr marL="6217874" marR="0" lvl="8" indent="-537347" algn="l" rtl="0">
+              <a:spcBef>
+                <a:spcPts val="604"/>
+              </a:spcBef>
+              <a:spcAft>
+                <a:spcPts val="0"/>
+              </a:spcAft>
+              <a:buClr>
+                <a:schemeClr val="dk1"/>
+              </a:buClr>
+              <a:buSzPts val="2000"/>
+              <a:buFont typeface="Arial"/>
+              <a:buChar char="•"/>
+              <a:defRPr sz="3022" b="0" i="0" u="none" strike="noStrike" cap="none">
+                <a:solidFill>
+                  <a:schemeClr val="dk1"/>
+                </a:solidFill>
+                <a:latin typeface="Arial"/>
+                <a:ea typeface="Arial"/>
+                <a:cs typeface="Arial"/>
+                <a:sym typeface="Arial"/>
+              </a:defRPr>
+            </a:lvl9pPr>
+          </a:lstStyle>
+          <a:p>
+            <a:endParaRPr/>
+          </a:p>
+        </p:txBody>
+      </p:sp>
+    </p:spTree>
+    <p:extLst>
+      <p:ext uri="{BB962C8B-B14F-4D97-AF65-F5344CB8AC3E}">
+        <p14:creationId xmlns:p14="http://schemas.microsoft.com/office/powerpoint/2010/main" val="3813279274"/>
+      </p:ext>
+    </p:extLst>
+  </p:cSld>
+  <p:clrMapOvr>
+    <a:masterClrMapping/>
+  </p:clrMapOvr>
+  <p:transition>
+    <p:fade/>
+  </p:transition>
+</p:sldLayout>
+</file>
+
 <file path=ppt/slideLayouts/slideLayout3.xml><?xml version="1.0" encoding="utf-8"?>
 <p:sldLayout xmlns:a="http://schemas.openxmlformats.org/drawingml/2006/main" xmlns:r="http://schemas.openxmlformats.org/officeDocument/2006/relationships" xmlns:p="http://schemas.openxmlformats.org/presentationml/2006/main" preserve="1" userDrawn="1">
   <p:cSld name="Title Green Ram CSU">
@@ -6317,6 +7108,7 @@
     <p:sldLayoutId id="2147483677" r:id="rId22"/>
     <p:sldLayoutId id="2147483692" r:id="rId23"/>
     <p:sldLayoutId id="2147483672" r:id="rId24"/>
+    <p:sldLayoutId id="2147483693" r:id="rId25"/>
   </p:sldLayoutIdLst>
   <mc:AlternateContent xmlns:mc="http://schemas.openxmlformats.org/markup-compatibility/2006" xmlns:p14="http://schemas.microsoft.com/office/powerpoint/2010/main">
     <mc:Choice Requires="p14">
@@ -6709,7 +7501,548 @@
 </p:sld>
 </file>
 
+<file path=ppt/slides/slide10.xml><?xml version="1.0" encoding="utf-8"?>
+<p:sld xmlns:a="http://schemas.openxmlformats.org/drawingml/2006/main" xmlns:r="http://schemas.openxmlformats.org/officeDocument/2006/relationships" xmlns:p="http://schemas.openxmlformats.org/presentationml/2006/main">
+  <p:cSld>
+    <p:spTree>
+      <p:nvGrpSpPr>
+        <p:cNvPr id="1" name=""/>
+        <p:cNvGrpSpPr/>
+        <p:nvPr/>
+      </p:nvGrpSpPr>
+      <p:grpSpPr>
+        <a:xfrm>
+          <a:off x="0" y="0"/>
+          <a:ext cx="0" cy="0"/>
+          <a:chOff x="0" y="0"/>
+          <a:chExt cx="0" cy="0"/>
+        </a:xfrm>
+      </p:grpSpPr>
+      <p:sp>
+        <p:nvSpPr>
+          <p:cNvPr id="2" name="Title 1">
+            <a:extLst>
+              <a:ext uri="{FF2B5EF4-FFF2-40B4-BE49-F238E27FC236}">
+                <a16:creationId xmlns:a16="http://schemas.microsoft.com/office/drawing/2014/main" id="{FC334E8A-B8C7-EC49-A694-7AA4D3D504FD}"/>
+              </a:ext>
+            </a:extLst>
+          </p:cNvPr>
+          <p:cNvSpPr>
+            <a:spLocks noGrp="1"/>
+          </p:cNvSpPr>
+          <p:nvPr>
+            <p:ph type="title"/>
+          </p:nvPr>
+        </p:nvSpPr>
+        <p:spPr/>
+        <p:txBody>
+          <a:bodyPr/>
+          <a:lstStyle/>
+          <a:p>
+            <a:r>
+              <a:rPr lang="en-US" dirty="0"/>
+              <a:t>Code Along</a:t>
+            </a:r>
+          </a:p>
+        </p:txBody>
+      </p:sp>
+      <p:sp>
+        <p:nvSpPr>
+          <p:cNvPr id="6" name="Text Placeholder 4">
+            <a:extLst>
+              <a:ext uri="{FF2B5EF4-FFF2-40B4-BE49-F238E27FC236}">
+                <a16:creationId xmlns:a16="http://schemas.microsoft.com/office/drawing/2014/main" id="{E9832979-4813-46BF-A325-4E6241C85E30}"/>
+              </a:ext>
+            </a:extLst>
+          </p:cNvPr>
+          <p:cNvSpPr>
+            <a:spLocks noGrp="1"/>
+          </p:cNvSpPr>
+          <p:nvPr>
+            <p:ph type="body" sz="quarter" idx="10"/>
+          </p:nvPr>
+        </p:nvSpPr>
+        <p:spPr>
+          <a:xfrm>
+            <a:off x="628072" y="1463722"/>
+            <a:ext cx="12561453" cy="6680034"/>
+          </a:xfrm>
+        </p:spPr>
+        <p:txBody>
+          <a:bodyPr/>
+          <a:lstStyle/>
+          <a:p>
+            <a:pPr fontAlgn="base"/>
+            <a:r>
+              <a:rPr lang="en-US" dirty="0"/>
+              <a:t>Write a method </a:t>
+            </a:r>
+            <a:r>
+              <a:rPr lang="en-US" dirty="0" err="1"/>
+              <a:t>fileReadingDouble</a:t>
+            </a:r>
+            <a:r>
+              <a:rPr lang="en-US" dirty="0"/>
+              <a:t>(String filename) that reads a file which contains double values and return an array with those values.</a:t>
+            </a:r>
+          </a:p>
+          <a:p>
+            <a:pPr fontAlgn="base"/>
+            <a:r>
+              <a:rPr lang="en-US" dirty="0"/>
+              <a:t>The file will have the following structure and content:</a:t>
+            </a:r>
+          </a:p>
+          <a:p>
+            <a:pPr fontAlgn="base"/>
+            <a:endParaRPr lang="en-US" dirty="0"/>
+          </a:p>
+          <a:p>
+            <a:pPr fontAlgn="base"/>
+            <a:endParaRPr lang="en-US" dirty="0"/>
+          </a:p>
+          <a:p>
+            <a:pPr fontAlgn="base"/>
+            <a:endParaRPr lang="en-US" dirty="0"/>
+          </a:p>
+          <a:p>
+            <a:pPr fontAlgn="base"/>
+            <a:endParaRPr lang="en-US" dirty="0"/>
+          </a:p>
+          <a:p>
+            <a:pPr fontAlgn="base"/>
+            <a:endParaRPr lang="en-US" dirty="0"/>
+          </a:p>
+          <a:p>
+            <a:pPr fontAlgn="base"/>
+            <a:r>
+              <a:rPr lang="en-US" dirty="0"/>
+              <a:t>We are going to use the following instructions to help us out to code this method:</a:t>
+            </a:r>
+          </a:p>
+          <a:p>
+            <a:pPr lvl="1" fontAlgn="base"/>
+            <a:r>
+              <a:rPr lang="en-US" dirty="0"/>
+              <a:t>Path </a:t>
+            </a:r>
+            <a:r>
+              <a:rPr lang="en-US" dirty="0" err="1"/>
+              <a:t>path</a:t>
+            </a:r>
+            <a:r>
+              <a:rPr lang="en-US" dirty="0"/>
+              <a:t> = </a:t>
+            </a:r>
+            <a:r>
+              <a:rPr lang="en-US" dirty="0" err="1"/>
+              <a:t>Paths.get</a:t>
+            </a:r>
+            <a:r>
+              <a:rPr lang="en-US" dirty="0"/>
+              <a:t>(name);</a:t>
+            </a:r>
+          </a:p>
+          <a:p>
+            <a:pPr lvl="1" fontAlgn="base"/>
+            <a:r>
+              <a:rPr lang="en-US" dirty="0"/>
+              <a:t>int lines = (int) </a:t>
+            </a:r>
+            <a:r>
+              <a:rPr lang="en-US" dirty="0" err="1"/>
+              <a:t>Files.lines</a:t>
+            </a:r>
+            <a:r>
+              <a:rPr lang="en-US" dirty="0"/>
+              <a:t>(path).count(); //to count the number of lines we have in the file</a:t>
+            </a:r>
+          </a:p>
+          <a:p>
+            <a:pPr lvl="2" fontAlgn="base"/>
+            <a:r>
+              <a:rPr lang="en-US" dirty="0"/>
+              <a:t>This instruction needs to be inside a try…catch block</a:t>
+            </a:r>
+          </a:p>
+          <a:p>
+            <a:pPr lvl="1" fontAlgn="base"/>
+            <a:endParaRPr lang="en-US" dirty="0"/>
+          </a:p>
+          <a:p>
+            <a:pPr fontAlgn="base"/>
+            <a:endParaRPr lang="en-US" dirty="0"/>
+          </a:p>
+          <a:p>
+            <a:pPr marL="0" indent="0" fontAlgn="base">
+              <a:buNone/>
+            </a:pPr>
+            <a:r>
+              <a:rPr lang="en-US" dirty="0"/>
+              <a:t>	</a:t>
+            </a:r>
+          </a:p>
+        </p:txBody>
+      </p:sp>
+      <p:pic>
+        <p:nvPicPr>
+          <p:cNvPr id="8" name="Picture 7">
+            <a:extLst>
+              <a:ext uri="{FF2B5EF4-FFF2-40B4-BE49-F238E27FC236}">
+                <a16:creationId xmlns:a16="http://schemas.microsoft.com/office/drawing/2014/main" id="{15FE55B2-6626-4E62-86A0-5E93D9D51CBC}"/>
+              </a:ext>
+            </a:extLst>
+          </p:cNvPr>
+          <p:cNvPicPr>
+            <a:picLocks noChangeAspect="1"/>
+          </p:cNvPicPr>
+          <p:nvPr/>
+        </p:nvPicPr>
+        <p:blipFill>
+          <a:blip r:embed="rId2"/>
+          <a:stretch>
+            <a:fillRect/>
+          </a:stretch>
+        </p:blipFill>
+        <p:spPr>
+          <a:xfrm>
+            <a:off x="1393603" y="2737663"/>
+            <a:ext cx="2455383" cy="2420962"/>
+          </a:xfrm>
+          <a:prstGeom prst="rect">
+            <a:avLst/>
+          </a:prstGeom>
+        </p:spPr>
+      </p:pic>
+    </p:spTree>
+    <p:extLst>
+      <p:ext uri="{BB962C8B-B14F-4D97-AF65-F5344CB8AC3E}">
+        <p14:creationId xmlns:p14="http://schemas.microsoft.com/office/powerpoint/2010/main" val="1476890346"/>
+      </p:ext>
+    </p:extLst>
+  </p:cSld>
+  <p:clrMapOvr>
+    <a:masterClrMapping/>
+  </p:clrMapOvr>
+  <mc:AlternateContent xmlns:mc="http://schemas.openxmlformats.org/markup-compatibility/2006" xmlns:p14="http://schemas.microsoft.com/office/powerpoint/2010/main">
+    <mc:Choice Requires="p14">
+      <p:transition p14:dur="300">
+        <p:fade/>
+      </p:transition>
+    </mc:Choice>
+    <mc:Fallback xmlns="">
+      <p:transition>
+        <p:fade/>
+      </p:transition>
+    </mc:Fallback>
+  </mc:AlternateContent>
+</p:sld>
+</file>
+
 <file path=ppt/slides/slide2.xml><?xml version="1.0" encoding="utf-8"?>
+<p:sld xmlns:a="http://schemas.openxmlformats.org/drawingml/2006/main" xmlns:r="http://schemas.openxmlformats.org/officeDocument/2006/relationships" xmlns:p="http://schemas.openxmlformats.org/presentationml/2006/main">
+  <p:cSld>
+    <p:spTree>
+      <p:nvGrpSpPr>
+        <p:cNvPr id="1" name=""/>
+        <p:cNvGrpSpPr/>
+        <p:nvPr/>
+      </p:nvGrpSpPr>
+      <p:grpSpPr>
+        <a:xfrm>
+          <a:off x="0" y="0"/>
+          <a:ext cx="0" cy="0"/>
+          <a:chOff x="0" y="0"/>
+          <a:chExt cx="0" cy="0"/>
+        </a:xfrm>
+      </p:grpSpPr>
+      <p:sp>
+        <p:nvSpPr>
+          <p:cNvPr id="4" name="Title 3">
+            <a:extLst>
+              <a:ext uri="{FF2B5EF4-FFF2-40B4-BE49-F238E27FC236}">
+                <a16:creationId xmlns:a16="http://schemas.microsoft.com/office/drawing/2014/main" id="{119AD8F2-D5DB-A84B-A5B3-F7935E3E6D1D}"/>
+              </a:ext>
+            </a:extLst>
+          </p:cNvPr>
+          <p:cNvSpPr>
+            <a:spLocks noGrp="1"/>
+          </p:cNvSpPr>
+          <p:nvPr>
+            <p:ph type="title"/>
+          </p:nvPr>
+        </p:nvSpPr>
+        <p:spPr>
+          <a:xfrm>
+            <a:off x="628076" y="607804"/>
+            <a:ext cx="5642096" cy="916848"/>
+          </a:xfrm>
+        </p:spPr>
+        <p:txBody>
+          <a:bodyPr/>
+          <a:lstStyle/>
+          <a:p>
+            <a:r>
+              <a:rPr lang="en-US" dirty="0"/>
+              <a:t>Announcements</a:t>
+            </a:r>
+          </a:p>
+        </p:txBody>
+      </p:sp>
+      <p:sp>
+        <p:nvSpPr>
+          <p:cNvPr id="5" name="Text Placeholder 4">
+            <a:extLst>
+              <a:ext uri="{FF2B5EF4-FFF2-40B4-BE49-F238E27FC236}">
+                <a16:creationId xmlns:a16="http://schemas.microsoft.com/office/drawing/2014/main" id="{1BBD0DB5-379A-304F-9307-E7B1A89B08F7}"/>
+              </a:ext>
+            </a:extLst>
+          </p:cNvPr>
+          <p:cNvSpPr>
+            <a:spLocks noGrp="1"/>
+          </p:cNvSpPr>
+          <p:nvPr>
+            <p:ph type="body" idx="1"/>
+          </p:nvPr>
+        </p:nvSpPr>
+        <p:spPr>
+          <a:xfrm>
+            <a:off x="628075" y="1647163"/>
+            <a:ext cx="8395419" cy="4379259"/>
+          </a:xfrm>
+        </p:spPr>
+        <p:txBody>
+          <a:bodyPr/>
+          <a:lstStyle/>
+          <a:p>
+            <a:pPr marL="930762" lvl="1" indent="0">
+              <a:buNone/>
+            </a:pPr>
+            <a:endParaRPr lang="en-US" dirty="0"/>
+          </a:p>
+          <a:p>
+            <a:r>
+              <a:rPr lang="en-US" dirty="0"/>
+              <a:t>Reminder – readings are due </a:t>
+            </a:r>
+            <a:r>
+              <a:rPr lang="en-US" b="1" dirty="0"/>
+              <a:t>before</a:t>
+            </a:r>
+            <a:r>
+              <a:rPr lang="en-US" dirty="0"/>
+              <a:t> lecture</a:t>
+            </a:r>
+          </a:p>
+          <a:p>
+            <a:pPr lvl="1"/>
+            <a:r>
+              <a:rPr lang="en-US" dirty="0"/>
+              <a:t>You don’t have to do all of it - challenge problems can be challenging…</a:t>
+            </a:r>
+          </a:p>
+          <a:p>
+            <a:pPr lvl="1"/>
+            <a:r>
+              <a:rPr lang="en-US" dirty="0"/>
+              <a:t>You can return to them. </a:t>
+            </a:r>
+          </a:p>
+          <a:p>
+            <a:pPr lvl="1"/>
+            <a:r>
+              <a:rPr lang="en-US" dirty="0"/>
+              <a:t>We start off each lecture with a quiz from your reading! </a:t>
+            </a:r>
+          </a:p>
+          <a:p>
+            <a:r>
+              <a:rPr lang="en-US" dirty="0"/>
+              <a:t>Make sure to review knowledge checks and spread out their use! </a:t>
+            </a:r>
+          </a:p>
+        </p:txBody>
+      </p:sp>
+      <p:sp>
+        <p:nvSpPr>
+          <p:cNvPr id="6" name="TextBox 5">
+            <a:extLst>
+              <a:ext uri="{FF2B5EF4-FFF2-40B4-BE49-F238E27FC236}">
+                <a16:creationId xmlns:a16="http://schemas.microsoft.com/office/drawing/2014/main" id="{32A3B87A-BBC0-704B-AC99-3984206450D5}"/>
+              </a:ext>
+            </a:extLst>
+          </p:cNvPr>
+          <p:cNvSpPr txBox="1"/>
+          <p:nvPr/>
+        </p:nvSpPr>
+        <p:spPr>
+          <a:xfrm>
+            <a:off x="9744412" y="2150737"/>
+            <a:ext cx="3892958" cy="2417650"/>
+          </a:xfrm>
+          <a:prstGeom prst="rect">
+            <a:avLst/>
+          </a:prstGeom>
+          <a:noFill/>
+        </p:spPr>
+        <p:txBody>
+          <a:bodyPr wrap="square" rtlCol="0">
+            <a:spAutoFit/>
+          </a:bodyPr>
+          <a:lstStyle/>
+          <a:p>
+            <a:r>
+              <a:rPr lang="en-US" sz="3022" dirty="0" err="1"/>
+              <a:t>Todo</a:t>
+            </a:r>
+            <a:r>
+              <a:rPr lang="en-US" sz="3022" dirty="0"/>
+              <a:t>:</a:t>
+            </a:r>
+          </a:p>
+          <a:p>
+            <a:r>
+              <a:rPr lang="en-US" sz="3022" dirty="0"/>
+              <a:t>Continue Practical 2 (should be started!)</a:t>
+            </a:r>
+          </a:p>
+          <a:p>
+            <a:endParaRPr lang="en-US" sz="3022" dirty="0"/>
+          </a:p>
+          <a:p>
+            <a:endParaRPr lang="en-US" sz="3022" dirty="0"/>
+          </a:p>
+        </p:txBody>
+      </p:sp>
+      <p:sp>
+        <p:nvSpPr>
+          <p:cNvPr id="7" name="TextBox 6">
+            <a:extLst>
+              <a:ext uri="{FF2B5EF4-FFF2-40B4-BE49-F238E27FC236}">
+                <a16:creationId xmlns:a16="http://schemas.microsoft.com/office/drawing/2014/main" id="{BF16D510-BC74-4FA5-AFD2-193B039115A5}"/>
+              </a:ext>
+            </a:extLst>
+          </p:cNvPr>
+          <p:cNvSpPr txBox="1"/>
+          <p:nvPr/>
+        </p:nvSpPr>
+        <p:spPr>
+          <a:xfrm>
+            <a:off x="7228114" y="362857"/>
+            <a:ext cx="6125029" cy="1015663"/>
+          </a:xfrm>
+          <a:prstGeom prst="rect">
+            <a:avLst/>
+          </a:prstGeom>
+          <a:solidFill>
+            <a:schemeClr val="accent2"/>
+          </a:solidFill>
+        </p:spPr>
+        <p:txBody>
+          <a:bodyPr wrap="square" rtlCol="0">
+            <a:spAutoFit/>
+          </a:bodyPr>
+          <a:lstStyle/>
+          <a:p>
+            <a:r>
+              <a:rPr lang="en-US" b="1" dirty="0"/>
+              <a:t>Opening Question: </a:t>
+            </a:r>
+          </a:p>
+          <a:p>
+            <a:r>
+              <a:rPr lang="en-US" dirty="0"/>
+              <a:t>How is your Knowledge Checks practice? Are you spacing and interleaving your practice?</a:t>
+            </a:r>
+          </a:p>
+        </p:txBody>
+      </p:sp>
+      <p:sp>
+        <p:nvSpPr>
+          <p:cNvPr id="8" name="TextBox 7">
+            <a:extLst>
+              <a:ext uri="{FF2B5EF4-FFF2-40B4-BE49-F238E27FC236}">
+                <a16:creationId xmlns:a16="http://schemas.microsoft.com/office/drawing/2014/main" id="{880D349E-8851-40B5-BCF5-C016EA02C2A6}"/>
+              </a:ext>
+            </a:extLst>
+          </p:cNvPr>
+          <p:cNvSpPr txBox="1"/>
+          <p:nvPr/>
+        </p:nvSpPr>
+        <p:spPr>
+          <a:xfrm>
+            <a:off x="979714" y="4468990"/>
+            <a:ext cx="10580915" cy="2554545"/>
+          </a:xfrm>
+          <a:prstGeom prst="rect">
+            <a:avLst/>
+          </a:prstGeom>
+          <a:noFill/>
+        </p:spPr>
+        <p:txBody>
+          <a:bodyPr wrap="square" rtlCol="0">
+            <a:spAutoFit/>
+          </a:bodyPr>
+          <a:lstStyle/>
+          <a:p>
+            <a:r>
+              <a:rPr lang="en-US" dirty="0"/>
+              <a:t>Wednesday October 6th at 6:00pm in CSB 130, ACM will be having a startup company called The Guide Network come to give a presentation on their platform and the design process behind their software. </a:t>
+            </a:r>
+            <a:r>
+              <a:rPr lang="en-US" dirty="0">
+                <a:hlinkClick r:id="rId2" tooltip="https://forms.gle/abay8fhpo8tfbst37"/>
+              </a:rPr>
+              <a:t>https://forms.gle/ABAY8FhPo8TfbSt37</a:t>
+            </a:r>
+            <a:endParaRPr lang="en-US" dirty="0"/>
+          </a:p>
+          <a:p>
+            <a:endParaRPr lang="en-US" dirty="0"/>
+          </a:p>
+          <a:p>
+            <a:r>
+              <a:rPr lang="en-US" dirty="0"/>
+              <a:t>Thursday October 7</a:t>
+            </a:r>
+            <a:r>
+              <a:rPr lang="en-US" baseline="30000" dirty="0"/>
+              <a:t>th</a:t>
+            </a:r>
+            <a:r>
+              <a:rPr lang="en-US" dirty="0"/>
+              <a:t> 5:30pm in CSB 425, ACM-W Celebrating women in computing will feature the documentary Lo and Behold: Reveries of the Connected World. Bring movie snacks if you like. </a:t>
+            </a:r>
+            <a:r>
+              <a:rPr lang="en-US" dirty="0">
+                <a:hlinkClick r:id="rId3" tooltip="https://forms.gle/zfajam2rm1q1tcuk7"/>
+              </a:rPr>
+              <a:t>https://forms.gle/ZFajAM2rM1Q1TcuK7</a:t>
+            </a:r>
+            <a:endParaRPr lang="en-US" dirty="0"/>
+          </a:p>
+          <a:p>
+            <a:endParaRPr lang="en-US" dirty="0"/>
+          </a:p>
+        </p:txBody>
+      </p:sp>
+    </p:spTree>
+    <p:extLst>
+      <p:ext uri="{BB962C8B-B14F-4D97-AF65-F5344CB8AC3E}">
+        <p14:creationId xmlns:p14="http://schemas.microsoft.com/office/powerpoint/2010/main" val="926474781"/>
+      </p:ext>
+    </p:extLst>
+  </p:cSld>
+  <p:clrMapOvr>
+    <a:masterClrMapping/>
+  </p:clrMapOvr>
+  <p:transition>
+    <p:fade/>
+  </p:transition>
+</p:sld>
+</file>
+
+<file path=ppt/slides/slide3.xml><?xml version="1.0" encoding="utf-8"?>
 <p:sld xmlns:a="http://schemas.openxmlformats.org/drawingml/2006/main" xmlns:r="http://schemas.openxmlformats.org/officeDocument/2006/relationships" xmlns:p="http://schemas.openxmlformats.org/presentationml/2006/main">
   <p:cSld>
     <p:spTree>
@@ -6749,7 +8082,7 @@
           <a:p>
             <a:r>
               <a:rPr lang="en-US" dirty="0"/>
-              <a:t>File IO</a:t>
+              <a:t>Scanner</a:t>
             </a:r>
           </a:p>
         </p:txBody>
@@ -6773,7 +8106,7 @@
         <p:spPr>
           <a:xfrm>
             <a:off x="628072" y="1463722"/>
-            <a:ext cx="12561453" cy="5668283"/>
+            <a:ext cx="12561453" cy="3657668"/>
           </a:xfrm>
         </p:spPr>
         <p:txBody>
@@ -6783,6 +8116,175 @@
             <a:pPr fontAlgn="base"/>
             <a:r>
               <a:rPr lang="en-US" dirty="0"/>
+              <a:t>When we want to read something from the terminal we use:</a:t>
+            </a:r>
+          </a:p>
+          <a:p>
+            <a:pPr marL="0" indent="0" fontAlgn="base">
+              <a:buNone/>
+            </a:pPr>
+            <a:r>
+              <a:rPr lang="en-US" dirty="0"/>
+              <a:t>	Scanner </a:t>
+            </a:r>
+            <a:r>
+              <a:rPr lang="en-US" dirty="0" err="1"/>
+              <a:t>scnr</a:t>
+            </a:r>
+            <a:r>
+              <a:rPr lang="en-US" dirty="0"/>
+              <a:t> = new Scanner(System.in);</a:t>
+            </a:r>
+          </a:p>
+          <a:p>
+            <a:pPr fontAlgn="base"/>
+            <a:r>
+              <a:rPr lang="en-US" dirty="0"/>
+              <a:t>The parameter System.in indicates that we are reading from the terminal.</a:t>
+            </a:r>
+          </a:p>
+          <a:p>
+            <a:pPr marL="0" indent="0" fontAlgn="base">
+              <a:buNone/>
+            </a:pPr>
+            <a:endParaRPr lang="en-US" dirty="0"/>
+          </a:p>
+          <a:p>
+            <a:pPr fontAlgn="base"/>
+            <a:r>
+              <a:rPr lang="en-US" dirty="0"/>
+              <a:t>What happens if instead of reading from the terminal, we want to read from a file?</a:t>
+            </a:r>
+          </a:p>
+          <a:p>
+            <a:pPr lvl="1" fontAlgn="base"/>
+            <a:r>
+              <a:rPr lang="en-US" dirty="0"/>
+              <a:t>We need to use the </a:t>
+            </a:r>
+            <a:r>
+              <a:rPr lang="en-US" dirty="0">
+                <a:hlinkClick r:id="rId2"/>
+              </a:rPr>
+              <a:t>File</a:t>
+            </a:r>
+            <a:r>
+              <a:rPr lang="en-US" dirty="0"/>
+              <a:t> class!</a:t>
+            </a:r>
+          </a:p>
+          <a:p>
+            <a:pPr lvl="1" fontAlgn="base"/>
+            <a:r>
+              <a:rPr lang="en-US" dirty="0"/>
+              <a:t>And pass an object of File as a parameter instead of System.in when we construct a Scanner object</a:t>
+            </a:r>
+          </a:p>
+          <a:p>
+            <a:pPr fontAlgn="base"/>
+            <a:endParaRPr lang="en-US" dirty="0"/>
+          </a:p>
+        </p:txBody>
+      </p:sp>
+    </p:spTree>
+    <p:extLst>
+      <p:ext uri="{BB962C8B-B14F-4D97-AF65-F5344CB8AC3E}">
+        <p14:creationId xmlns:p14="http://schemas.microsoft.com/office/powerpoint/2010/main" val="1011463358"/>
+      </p:ext>
+    </p:extLst>
+  </p:cSld>
+  <p:clrMapOvr>
+    <a:masterClrMapping/>
+  </p:clrMapOvr>
+  <mc:AlternateContent xmlns:mc="http://schemas.openxmlformats.org/markup-compatibility/2006" xmlns:p14="http://schemas.microsoft.com/office/powerpoint/2010/main">
+    <mc:Choice Requires="p14">
+      <p:transition p14:dur="300">
+        <p:fade/>
+      </p:transition>
+    </mc:Choice>
+    <mc:Fallback xmlns="">
+      <p:transition>
+        <p:fade/>
+      </p:transition>
+    </mc:Fallback>
+  </mc:AlternateContent>
+</p:sld>
+</file>
+
+<file path=ppt/slides/slide4.xml><?xml version="1.0" encoding="utf-8"?>
+<p:sld xmlns:a="http://schemas.openxmlformats.org/drawingml/2006/main" xmlns:r="http://schemas.openxmlformats.org/officeDocument/2006/relationships" xmlns:p="http://schemas.openxmlformats.org/presentationml/2006/main">
+  <p:cSld>
+    <p:spTree>
+      <p:nvGrpSpPr>
+        <p:cNvPr id="1" name=""/>
+        <p:cNvGrpSpPr/>
+        <p:nvPr/>
+      </p:nvGrpSpPr>
+      <p:grpSpPr>
+        <a:xfrm>
+          <a:off x="0" y="0"/>
+          <a:ext cx="0" cy="0"/>
+          <a:chOff x="0" y="0"/>
+          <a:chExt cx="0" cy="0"/>
+        </a:xfrm>
+      </p:grpSpPr>
+      <p:sp>
+        <p:nvSpPr>
+          <p:cNvPr id="4" name="Title 3">
+            <a:extLst>
+              <a:ext uri="{FF2B5EF4-FFF2-40B4-BE49-F238E27FC236}">
+                <a16:creationId xmlns:a16="http://schemas.microsoft.com/office/drawing/2014/main" id="{683FFEF0-EAC6-454C-9E58-568E0B3AD6FB}"/>
+              </a:ext>
+            </a:extLst>
+          </p:cNvPr>
+          <p:cNvSpPr>
+            <a:spLocks noGrp="1"/>
+          </p:cNvSpPr>
+          <p:nvPr>
+            <p:ph type="title"/>
+          </p:nvPr>
+        </p:nvSpPr>
+        <p:spPr/>
+        <p:txBody>
+          <a:bodyPr/>
+          <a:lstStyle/>
+          <a:p>
+            <a:r>
+              <a:rPr lang="en-US" dirty="0"/>
+              <a:t>File IO</a:t>
+            </a:r>
+          </a:p>
+        </p:txBody>
+      </p:sp>
+      <p:sp>
+        <p:nvSpPr>
+          <p:cNvPr id="5" name="Text Placeholder 4">
+            <a:extLst>
+              <a:ext uri="{FF2B5EF4-FFF2-40B4-BE49-F238E27FC236}">
+                <a16:creationId xmlns:a16="http://schemas.microsoft.com/office/drawing/2014/main" id="{B14CD88C-B718-634B-8318-80188AABD775}"/>
+              </a:ext>
+            </a:extLst>
+          </p:cNvPr>
+          <p:cNvSpPr>
+            <a:spLocks noGrp="1"/>
+          </p:cNvSpPr>
+          <p:nvPr>
+            <p:ph type="body" sz="quarter" idx="10"/>
+          </p:nvPr>
+        </p:nvSpPr>
+        <p:spPr>
+          <a:xfrm>
+            <a:off x="628072" y="1463722"/>
+            <a:ext cx="12561453" cy="5668283"/>
+          </a:xfrm>
+        </p:spPr>
+        <p:txBody>
+          <a:bodyPr/>
+          <a:lstStyle/>
+          <a:p>
+            <a:pPr fontAlgn="base"/>
+            <a:r>
+              <a:rPr lang="en-US" dirty="0"/>
               <a:t>Java makes it really simple - </a:t>
             </a:r>
           </a:p>
@@ -6873,7 +8375,7 @@
             </a:r>
           </a:p>
           <a:p>
-            <a:pPr lvl="2" fontAlgn="base"/>
+            <a:pPr lvl="3" fontAlgn="base"/>
             <a:r>
               <a:rPr lang="en-US" dirty="0" err="1"/>
               <a:t>Data.csv</a:t>
@@ -6881,7 +8383,7 @@
             <a:endParaRPr lang="en-US" dirty="0"/>
           </a:p>
           <a:p>
-            <a:pPr lvl="2" fontAlgn="base"/>
+            <a:pPr lvl="3" fontAlgn="base"/>
             <a:r>
               <a:rPr lang="en-US" dirty="0" err="1"/>
               <a:t>Hello.txt</a:t>
@@ -6889,7 +8391,7 @@
             <a:endParaRPr lang="en-US" dirty="0"/>
           </a:p>
           <a:p>
-            <a:pPr lvl="2" fontAlgn="base"/>
+            <a:pPr lvl="3" fontAlgn="base"/>
             <a:r>
               <a:rPr lang="en-US" dirty="0" err="1"/>
               <a:t>Index.html</a:t>
@@ -6926,7 +8428,7 @@
 </p:sld>
 </file>
 
-<file path=ppt/slides/slide3.xml><?xml version="1.0" encoding="utf-8"?>
+<file path=ppt/slides/slide5.xml><?xml version="1.0" encoding="utf-8"?>
 <p:sld xmlns:a="http://schemas.openxmlformats.org/drawingml/2006/main" xmlns:r="http://schemas.openxmlformats.org/officeDocument/2006/relationships" xmlns:p="http://schemas.openxmlformats.org/presentationml/2006/main">
   <p:cSld>
     <p:spTree>
@@ -7026,33 +8528,19 @@
                 <a:latin typeface="Consolas" panose="020B0609020204030204" pitchFamily="49" charset="0"/>
                 <a:cs typeface="Consolas" panose="020B0609020204030204" pitchFamily="49" charset="0"/>
               </a:rPr>
-              <a:t>Scanner scanner = new Scanner(new File(“</a:t>
-            </a:r>
-            <a:r>
-              <a:rPr lang="en-US" sz="1600" dirty="0" err="1">
-                <a:latin typeface="Consolas" panose="020B0609020204030204" pitchFamily="49" charset="0"/>
-                <a:cs typeface="Consolas" panose="020B0609020204030204" pitchFamily="49" charset="0"/>
-              </a:rPr>
-              <a:t>input.txt</a:t>
-            </a:r>
+              <a:t>	Scanner scanner = new Scanner(new File(“input.txt”));</a:t>
+            </a:r>
+          </a:p>
+          <a:p>
+            <a:pPr marL="0" indent="0">
+              <a:buNone/>
+            </a:pPr>
             <a:r>
               <a:rPr lang="en-US" sz="1600" dirty="0">
                 <a:latin typeface="Consolas" panose="020B0609020204030204" pitchFamily="49" charset="0"/>
                 <a:cs typeface="Consolas" panose="020B0609020204030204" pitchFamily="49" charset="0"/>
               </a:rPr>
-              <a:t>”));</a:t>
-            </a:r>
-          </a:p>
-          <a:p>
-            <a:pPr marL="0" indent="0">
-              <a:buNone/>
-            </a:pPr>
-            <a:r>
-              <a:rPr lang="en-US" sz="1600" dirty="0">
-                <a:latin typeface="Consolas" panose="020B0609020204030204" pitchFamily="49" charset="0"/>
-                <a:cs typeface="Consolas" panose="020B0609020204030204" pitchFamily="49" charset="0"/>
-              </a:rPr>
-              <a:t>String line = </a:t>
+              <a:t>	String line = </a:t>
             </a:r>
             <a:r>
               <a:rPr lang="en-US" sz="1600" dirty="0" err="1">
@@ -7078,7 +8566,7 @@
                 <a:latin typeface="Consolas" panose="020B0609020204030204" pitchFamily="49" charset="0"/>
                 <a:cs typeface="Consolas" panose="020B0609020204030204" pitchFamily="49" charset="0"/>
               </a:rPr>
-              <a:t>double </a:t>
+              <a:t>	double </a:t>
             </a:r>
             <a:r>
               <a:rPr lang="en-US" sz="1600" dirty="0" err="1">
@@ -7114,6 +8602,13 @@
               <a:buNone/>
             </a:pPr>
             <a:r>
+              <a:rPr lang="en-US" sz="1600" dirty="0">
+                <a:latin typeface="Consolas" panose="020B0609020204030204" pitchFamily="49" charset="0"/>
+                <a:cs typeface="Consolas" panose="020B0609020204030204" pitchFamily="49" charset="0"/>
+              </a:rPr>
+              <a:t>	</a:t>
+            </a:r>
+            <a:r>
               <a:rPr lang="en-US" sz="1600" dirty="0" err="1">
                 <a:latin typeface="Consolas" panose="020B0609020204030204" pitchFamily="49" charset="0"/>
                 <a:cs typeface="Consolas" panose="020B0609020204030204" pitchFamily="49" charset="0"/>
@@ -7132,6 +8627,13 @@
             <a:pPr marL="0" indent="0">
               <a:buNone/>
             </a:pPr>
+            <a:r>
+              <a:rPr lang="en-US" sz="1600" dirty="0">
+                <a:latin typeface="Consolas" panose="020B0609020204030204" pitchFamily="49" charset="0"/>
+                <a:cs typeface="Consolas" panose="020B0609020204030204" pitchFamily="49" charset="0"/>
+              </a:rPr>
+              <a:t>	</a:t>
+            </a:r>
             <a:r>
               <a:rPr lang="en-US" sz="1600" dirty="0" err="1">
                 <a:latin typeface="Consolas" panose="020B0609020204030204" pitchFamily="49" charset="0"/>
@@ -7172,21 +8674,7 @@
                 <a:latin typeface="Consolas" panose="020B0609020204030204" pitchFamily="49" charset="0"/>
                 <a:cs typeface="Consolas" panose="020B0609020204030204" pitchFamily="49" charset="0"/>
               </a:rPr>
-              <a:t>Scanner in = new Scanner (new File("</a:t>
-            </a:r>
-            <a:r>
-              <a:rPr lang="en-US" b="1" dirty="0" err="1">
-                <a:latin typeface="Consolas" panose="020B0609020204030204" pitchFamily="49" charset="0"/>
-                <a:cs typeface="Consolas" panose="020B0609020204030204" pitchFamily="49" charset="0"/>
-              </a:rPr>
-              <a:t>input.txt</a:t>
-            </a:r>
-            <a:r>
-              <a:rPr lang="en-US" b="1" dirty="0">
-                <a:latin typeface="Consolas" panose="020B0609020204030204" pitchFamily="49" charset="0"/>
-                <a:cs typeface="Consolas" panose="020B0609020204030204" pitchFamily="49" charset="0"/>
-              </a:rPr>
-              <a:t>"));</a:t>
+              <a:t>	Scanner in = new Scanner (new File("input.txt"));</a:t>
             </a:r>
             <a:endParaRPr lang="en-US" dirty="0">
               <a:latin typeface="Consolas" panose="020B0609020204030204" pitchFamily="49" charset="0"/>
@@ -7220,7 +8708,7 @@
 </p:sld>
 </file>
 
-<file path=ppt/slides/slide4.xml><?xml version="1.0" encoding="utf-8"?>
+<file path=ppt/slides/slide6.xml><?xml version="1.0" encoding="utf-8"?>
 <p:sld xmlns:a="http://schemas.openxmlformats.org/drawingml/2006/main" xmlns:r="http://schemas.openxmlformats.org/officeDocument/2006/relationships" xmlns:p="http://schemas.openxmlformats.org/presentationml/2006/main">
   <p:cSld>
     <p:spTree>
@@ -7514,7 +9002,7 @@
 </p:sld>
 </file>
 
-<file path=ppt/slides/slide5.xml><?xml version="1.0" encoding="utf-8"?>
+<file path=ppt/slides/slide7.xml><?xml version="1.0" encoding="utf-8"?>
 <p:sld xmlns:a="http://schemas.openxmlformats.org/drawingml/2006/main" xmlns:r="http://schemas.openxmlformats.org/officeDocument/2006/relationships" xmlns:p="http://schemas.openxmlformats.org/presentationml/2006/main">
   <p:cSld>
     <p:spTree>
@@ -7690,7 +9178,7 @@
 </p:sld>
 </file>
 
-<file path=ppt/slides/slide6.xml><?xml version="1.0" encoding="utf-8"?>
+<file path=ppt/slides/slide8.xml><?xml version="1.0" encoding="utf-8"?>
 <p:sld xmlns:a="http://schemas.openxmlformats.org/drawingml/2006/main" xmlns:r="http://schemas.openxmlformats.org/officeDocument/2006/relationships" xmlns:p="http://schemas.openxmlformats.org/presentationml/2006/main">
   <p:cSld>
     <p:spTree>
@@ -7815,7 +9303,7 @@
         <p:spPr>
           <a:xfrm>
             <a:off x="393700" y="1776682"/>
-            <a:ext cx="8394700" cy="4093428"/>
+            <a:ext cx="8665240" cy="4093428"/>
           </a:xfrm>
           <a:prstGeom prst="rect">
             <a:avLst/>
@@ -7921,25 +9409,7 @@
                 </a:solidFill>
                 <a:latin typeface="Consolas" panose="020B0609020204030204" pitchFamily="49" charset="0"/>
               </a:rPr>
-              <a:t> = new Scanner(new File(“</a:t>
-            </a:r>
-            <a:r>
-              <a:rPr lang="en-US" dirty="0" err="1">
-                <a:solidFill>
-                  <a:srgbClr val="000000"/>
-                </a:solidFill>
-                <a:latin typeface="Consolas" panose="020B0609020204030204" pitchFamily="49" charset="0"/>
-              </a:rPr>
-              <a:t>file.txt</a:t>
-            </a:r>
-            <a:r>
-              <a:rPr lang="en-US" dirty="0">
-                <a:solidFill>
-                  <a:srgbClr val="000000"/>
-                </a:solidFill>
-                <a:latin typeface="Consolas" panose="020B0609020204030204" pitchFamily="49" charset="0"/>
-              </a:rPr>
-              <a:t>”))</a:t>
+              <a:t> = new Scanner(new File(“file.txt”));</a:t>
             </a:r>
             <a:endParaRPr lang="en-US" dirty="0"/>
           </a:p>
@@ -8356,7 +9826,7 @@
 </p:sld>
 </file>
 
-<file path=ppt/slides/slide7.xml><?xml version="1.0" encoding="utf-8"?>
+<file path=ppt/slides/slide9.xml><?xml version="1.0" encoding="utf-8"?>
 <p:sld xmlns:a="http://schemas.openxmlformats.org/drawingml/2006/main" xmlns:r="http://schemas.openxmlformats.org/officeDocument/2006/relationships" xmlns:p="http://schemas.openxmlformats.org/presentationml/2006/main">
   <p:cSld>
     <p:spTree>

</xml_diff>

<commit_message>
update next weeks lectures
</commit_message>
<xml_diff>
--- a/slides/On-Campus/07_02_FileInput.pptx
+++ b/slides/On-Campus/07_02_FileInput.pptx
@@ -415,7 +415,7 @@
           <a:p>
             <a:fld id="{4D7E51A5-B478-1E40-8CBB-0DAA8831E99D}" type="datetimeFigureOut">
               <a:rPr lang="en-US" smtClean="0"/>
-              <a:t>10/5/2021</a:t>
+              <a:t>10/6/21</a:t>
             </a:fld>
             <a:endParaRPr lang="en-US"/>
           </a:p>
@@ -580,7 +580,7 @@
           <a:p>
             <a:fld id="{D0ED587F-861E-6740-9643-E3DDAE89B8D6}" type="datetimeFigureOut">
               <a:rPr lang="en-US" smtClean="0"/>
-              <a:t>10/5/2021</a:t>
+              <a:t>10/6/21</a:t>
             </a:fld>
             <a:endParaRPr lang="en-US"/>
           </a:p>
@@ -8279,7 +8279,7 @@
             <a:pPr lvl="1"/>
             <a:r>
               <a:rPr lang="en-US" dirty="0"/>
-              <a:t>Monday: Catch-Up / Student 		         Guided Topics (maybe P3?)</a:t>
+              <a:t>Monday: Review / Student Guided Topics</a:t>
             </a:r>
           </a:p>
           <a:p>
@@ -8293,7 +8293,7 @@
             <a:pPr lvl="1"/>
             <a:r>
               <a:rPr lang="en-US" dirty="0"/>
-              <a:t>Wednesday: Review (as needed)</a:t>
+              <a:t>Wednesday: Additional Drop By Hours</a:t>
             </a:r>
           </a:p>
           <a:p>

</xml_diff>

<commit_message>
added step slides and default code to start with
</commit_message>
<xml_diff>
--- a/slides/On-Campus/07_02_FileInput.pptx
+++ b/slides/On-Campus/07_02_FileInput.pptx
@@ -5,10 +5,10 @@
     <p:sldMasterId id="2147483648" r:id="rId1"/>
   </p:sldMasterIdLst>
   <p:notesMasterIdLst>
-    <p:notesMasterId r:id="rId12"/>
+    <p:notesMasterId r:id="rId15"/>
   </p:notesMasterIdLst>
   <p:handoutMasterIdLst>
-    <p:handoutMasterId r:id="rId13"/>
+    <p:handoutMasterId r:id="rId16"/>
   </p:handoutMasterIdLst>
   <p:sldIdLst>
     <p:sldId id="256" r:id="rId2"/>
@@ -21,6 +21,9 @@
     <p:sldId id="261" r:id="rId9"/>
     <p:sldId id="262" r:id="rId10"/>
     <p:sldId id="263" r:id="rId11"/>
+    <p:sldId id="267" r:id="rId12"/>
+    <p:sldId id="268" r:id="rId13"/>
+    <p:sldId id="269" r:id="rId14"/>
   </p:sldIdLst>
   <p:sldSz cx="13817600" cy="7772400"/>
   <p:notesSz cx="6858000" cy="9144000"/>
@@ -7718,6 +7721,1216 @@
     <p:extLst>
       <p:ext uri="{BB962C8B-B14F-4D97-AF65-F5344CB8AC3E}">
         <p14:creationId xmlns:p14="http://schemas.microsoft.com/office/powerpoint/2010/main" val="1476890346"/>
+      </p:ext>
+    </p:extLst>
+  </p:cSld>
+  <p:clrMapOvr>
+    <a:masterClrMapping/>
+  </p:clrMapOvr>
+  <mc:AlternateContent xmlns:mc="http://schemas.openxmlformats.org/markup-compatibility/2006" xmlns:p14="http://schemas.microsoft.com/office/powerpoint/2010/main">
+    <mc:Choice Requires="p14">
+      <p:transition p14:dur="300">
+        <p:fade/>
+      </p:transition>
+    </mc:Choice>
+    <mc:Fallback xmlns="">
+      <p:transition>
+        <p:fade/>
+      </p:transition>
+    </mc:Fallback>
+  </mc:AlternateContent>
+</p:sld>
+</file>
+
+<file path=ppt/slides/slide11.xml><?xml version="1.0" encoding="utf-8"?>
+<p:sld xmlns:a="http://schemas.openxmlformats.org/drawingml/2006/main" xmlns:r="http://schemas.openxmlformats.org/officeDocument/2006/relationships" xmlns:p="http://schemas.openxmlformats.org/presentationml/2006/main">
+  <p:cSld>
+    <p:spTree>
+      <p:nvGrpSpPr>
+        <p:cNvPr id="1" name=""/>
+        <p:cNvGrpSpPr/>
+        <p:nvPr/>
+      </p:nvGrpSpPr>
+      <p:grpSpPr>
+        <a:xfrm>
+          <a:off x="0" y="0"/>
+          <a:ext cx="0" cy="0"/>
+          <a:chOff x="0" y="0"/>
+          <a:chExt cx="0" cy="0"/>
+        </a:xfrm>
+      </p:grpSpPr>
+      <p:sp>
+        <p:nvSpPr>
+          <p:cNvPr id="2" name="Title 1">
+            <a:extLst>
+              <a:ext uri="{FF2B5EF4-FFF2-40B4-BE49-F238E27FC236}">
+                <a16:creationId xmlns:a16="http://schemas.microsoft.com/office/drawing/2014/main" id="{B7EDF46A-20D2-9540-BCA1-0B0CAB4B2AB3}"/>
+              </a:ext>
+            </a:extLst>
+          </p:cNvPr>
+          <p:cNvSpPr>
+            <a:spLocks noGrp="1"/>
+          </p:cNvSpPr>
+          <p:nvPr>
+            <p:ph type="title"/>
+          </p:nvPr>
+        </p:nvSpPr>
+        <p:spPr/>
+        <p:txBody>
+          <a:bodyPr/>
+          <a:lstStyle/>
+          <a:p>
+            <a:r>
+              <a:rPr lang="en-US" dirty="0"/>
+              <a:t>Step 1: Read the File</a:t>
+            </a:r>
+          </a:p>
+        </p:txBody>
+      </p:sp>
+      <p:sp>
+        <p:nvSpPr>
+          <p:cNvPr id="3" name="Text Placeholder 2">
+            <a:extLst>
+              <a:ext uri="{FF2B5EF4-FFF2-40B4-BE49-F238E27FC236}">
+                <a16:creationId xmlns:a16="http://schemas.microsoft.com/office/drawing/2014/main" id="{0AEC0B01-EE5D-884E-9723-072142400638}"/>
+              </a:ext>
+            </a:extLst>
+          </p:cNvPr>
+          <p:cNvSpPr>
+            <a:spLocks noGrp="1"/>
+          </p:cNvSpPr>
+          <p:nvPr>
+            <p:ph type="body" sz="quarter" idx="10"/>
+          </p:nvPr>
+        </p:nvSpPr>
+        <p:spPr>
+          <a:xfrm>
+            <a:off x="628075" y="1776682"/>
+            <a:ext cx="8899747" cy="1602490"/>
+          </a:xfrm>
+        </p:spPr>
+        <p:txBody>
+          <a:bodyPr/>
+          <a:lstStyle/>
+          <a:p>
+            <a:r>
+              <a:rPr lang="en-US" dirty="0"/>
+              <a:t>Print out the contents of the file by reading it in</a:t>
+            </a:r>
+          </a:p>
+          <a:p>
+            <a:pPr lvl="1"/>
+            <a:r>
+              <a:rPr lang="en-US" dirty="0"/>
+              <a:t>Look back at a past slide</a:t>
+            </a:r>
+          </a:p>
+          <a:p>
+            <a:pPr lvl="1"/>
+            <a:r>
+              <a:rPr lang="en-US" dirty="0"/>
+              <a:t>Remember try/catch</a:t>
+            </a:r>
+          </a:p>
+          <a:p>
+            <a:pPr lvl="1"/>
+            <a:r>
+              <a:rPr lang="en-US" dirty="0"/>
+              <a:t>Just print, don’t worry about the rest</a:t>
+            </a:r>
+          </a:p>
+        </p:txBody>
+      </p:sp>
+      <p:sp>
+        <p:nvSpPr>
+          <p:cNvPr id="5" name="TextBox 4">
+            <a:extLst>
+              <a:ext uri="{FF2B5EF4-FFF2-40B4-BE49-F238E27FC236}">
+                <a16:creationId xmlns:a16="http://schemas.microsoft.com/office/drawing/2014/main" id="{83E0430A-B297-0146-B065-3BD1DB106118}"/>
+              </a:ext>
+            </a:extLst>
+          </p:cNvPr>
+          <p:cNvSpPr txBox="1"/>
+          <p:nvPr/>
+        </p:nvSpPr>
+        <p:spPr>
+          <a:xfrm>
+            <a:off x="7676445" y="135099"/>
+            <a:ext cx="6009791" cy="1323439"/>
+          </a:xfrm>
+          <a:prstGeom prst="rect">
+            <a:avLst/>
+          </a:prstGeom>
+          <a:solidFill>
+            <a:schemeClr val="accent2"/>
+          </a:solidFill>
+        </p:spPr>
+        <p:txBody>
+          <a:bodyPr wrap="square">
+            <a:spAutoFit/>
+          </a:bodyPr>
+          <a:lstStyle/>
+          <a:p>
+            <a:pPr fontAlgn="base"/>
+            <a:r>
+              <a:rPr lang="en-US" b="1" dirty="0"/>
+              <a:t>What is my quest?</a:t>
+            </a:r>
+          </a:p>
+          <a:p>
+            <a:pPr fontAlgn="base"/>
+            <a:r>
+              <a:rPr lang="en-US" dirty="0"/>
+              <a:t>Write a method </a:t>
+            </a:r>
+            <a:r>
+              <a:rPr lang="en-US" dirty="0" err="1"/>
+              <a:t>fileReadingDouble</a:t>
+            </a:r>
+            <a:r>
+              <a:rPr lang="en-US" dirty="0"/>
+              <a:t>(String filename) that reads a file which contains double values and return an array with those values.</a:t>
+            </a:r>
+          </a:p>
+        </p:txBody>
+      </p:sp>
+      <p:sp>
+        <p:nvSpPr>
+          <p:cNvPr id="7" name="Snip Single Corner Rectangle 6">
+            <a:extLst>
+              <a:ext uri="{FF2B5EF4-FFF2-40B4-BE49-F238E27FC236}">
+                <a16:creationId xmlns:a16="http://schemas.microsoft.com/office/drawing/2014/main" id="{069B9205-FB70-EA4C-A404-B53C50ED10ED}"/>
+              </a:ext>
+            </a:extLst>
+          </p:cNvPr>
+          <p:cNvSpPr/>
+          <p:nvPr/>
+        </p:nvSpPr>
+        <p:spPr>
+          <a:xfrm>
+            <a:off x="12440356" y="5440908"/>
+            <a:ext cx="1106311" cy="1761066"/>
+          </a:xfrm>
+          <a:prstGeom prst="snip1Rect">
+            <a:avLst/>
+          </a:prstGeom>
+          <a:noFill/>
+          <a:ln>
+            <a:solidFill>
+              <a:schemeClr val="accent2"/>
+            </a:solidFill>
+          </a:ln>
+          <a:effectLst/>
+        </p:spPr>
+        <p:style>
+          <a:lnRef idx="1">
+            <a:schemeClr val="accent1"/>
+          </a:lnRef>
+          <a:fillRef idx="3">
+            <a:schemeClr val="accent1"/>
+          </a:fillRef>
+          <a:effectRef idx="2">
+            <a:schemeClr val="accent1"/>
+          </a:effectRef>
+          <a:fontRef idx="minor">
+            <a:schemeClr val="lt1"/>
+          </a:fontRef>
+        </p:style>
+        <p:txBody>
+          <a:bodyPr lIns="274320" tIns="182880" rIns="274320" bIns="182880" rtlCol="0" anchor="ctr"/>
+          <a:lstStyle/>
+          <a:p>
+            <a:pPr algn="ctr"/>
+            <a:r>
+              <a:rPr lang="en-US" dirty="0">
+                <a:ln w="0"/>
+                <a:solidFill>
+                  <a:schemeClr val="tx1"/>
+                </a:solidFill>
+                <a:effectLst>
+                  <a:outerShdw blurRad="38100" dist="19050" dir="2700000" algn="tl" rotWithShape="0">
+                    <a:schemeClr val="dk1">
+                      <a:alpha val="40000"/>
+                    </a:schemeClr>
+                  </a:outerShdw>
+                </a:effectLst>
+              </a:rPr>
+              <a:t>1.0</a:t>
+            </a:r>
+            <a:br>
+              <a:rPr lang="en-US" dirty="0">
+                <a:ln w="0"/>
+                <a:solidFill>
+                  <a:schemeClr val="tx1"/>
+                </a:solidFill>
+                <a:effectLst>
+                  <a:outerShdw blurRad="38100" dist="19050" dir="2700000" algn="tl" rotWithShape="0">
+                    <a:schemeClr val="dk1">
+                      <a:alpha val="40000"/>
+                    </a:schemeClr>
+                  </a:outerShdw>
+                </a:effectLst>
+              </a:rPr>
+            </a:br>
+            <a:r>
+              <a:rPr lang="en-US" dirty="0">
+                <a:ln w="0"/>
+                <a:solidFill>
+                  <a:schemeClr val="tx1"/>
+                </a:solidFill>
+                <a:effectLst>
+                  <a:outerShdw blurRad="38100" dist="19050" dir="2700000" algn="tl" rotWithShape="0">
+                    <a:schemeClr val="dk1">
+                      <a:alpha val="40000"/>
+                    </a:schemeClr>
+                  </a:outerShdw>
+                </a:effectLst>
+              </a:rPr>
+              <a:t>2.5</a:t>
+            </a:r>
+            <a:br>
+              <a:rPr lang="en-US" dirty="0">
+                <a:ln w="0"/>
+                <a:solidFill>
+                  <a:schemeClr val="tx1"/>
+                </a:solidFill>
+                <a:effectLst>
+                  <a:outerShdw blurRad="38100" dist="19050" dir="2700000" algn="tl" rotWithShape="0">
+                    <a:schemeClr val="dk1">
+                      <a:alpha val="40000"/>
+                    </a:schemeClr>
+                  </a:outerShdw>
+                </a:effectLst>
+              </a:rPr>
+            </a:br>
+            <a:r>
+              <a:rPr lang="en-US" dirty="0">
+                <a:ln w="0"/>
+                <a:solidFill>
+                  <a:schemeClr val="tx1"/>
+                </a:solidFill>
+                <a:effectLst>
+                  <a:outerShdw blurRad="38100" dist="19050" dir="2700000" algn="tl" rotWithShape="0">
+                    <a:schemeClr val="dk1">
+                      <a:alpha val="40000"/>
+                    </a:schemeClr>
+                  </a:outerShdw>
+                </a:effectLst>
+              </a:rPr>
+              <a:t>3.0</a:t>
+            </a:r>
+            <a:br>
+              <a:rPr lang="en-US" dirty="0">
+                <a:ln w="0"/>
+                <a:solidFill>
+                  <a:schemeClr val="tx1"/>
+                </a:solidFill>
+                <a:effectLst>
+                  <a:outerShdw blurRad="38100" dist="19050" dir="2700000" algn="tl" rotWithShape="0">
+                    <a:schemeClr val="dk1">
+                      <a:alpha val="40000"/>
+                    </a:schemeClr>
+                  </a:outerShdw>
+                </a:effectLst>
+              </a:rPr>
+            </a:br>
+            <a:r>
+              <a:rPr lang="en-US" dirty="0">
+                <a:ln w="0"/>
+                <a:solidFill>
+                  <a:schemeClr val="tx1"/>
+                </a:solidFill>
+                <a:effectLst>
+                  <a:outerShdw blurRad="38100" dist="19050" dir="2700000" algn="tl" rotWithShape="0">
+                    <a:schemeClr val="dk1">
+                      <a:alpha val="40000"/>
+                    </a:schemeClr>
+                  </a:outerShdw>
+                </a:effectLst>
+              </a:rPr>
+              <a:t>4.5</a:t>
+            </a:r>
+            <a:br>
+              <a:rPr lang="en-US" dirty="0">
+                <a:ln w="0"/>
+                <a:solidFill>
+                  <a:schemeClr val="tx1"/>
+                </a:solidFill>
+                <a:effectLst>
+                  <a:outerShdw blurRad="38100" dist="19050" dir="2700000" algn="tl" rotWithShape="0">
+                    <a:schemeClr val="dk1">
+                      <a:alpha val="40000"/>
+                    </a:schemeClr>
+                  </a:outerShdw>
+                </a:effectLst>
+              </a:rPr>
+            </a:br>
+            <a:r>
+              <a:rPr lang="en-US" dirty="0">
+                <a:ln w="0"/>
+                <a:solidFill>
+                  <a:schemeClr val="tx1"/>
+                </a:solidFill>
+                <a:effectLst>
+                  <a:outerShdw blurRad="38100" dist="19050" dir="2700000" algn="tl" rotWithShape="0">
+                    <a:schemeClr val="dk1">
+                      <a:alpha val="40000"/>
+                    </a:schemeClr>
+                  </a:outerShdw>
+                </a:effectLst>
+              </a:rPr>
+              <a:t>5.0</a:t>
+            </a:r>
+            <a:endParaRPr lang="en-US" dirty="0">
+              <a:ln w="0"/>
+              <a:solidFill>
+                <a:schemeClr val="tx1"/>
+              </a:solidFill>
+              <a:effectLst>
+                <a:outerShdw blurRad="38100" dist="19050" dir="2700000" algn="tl" rotWithShape="0">
+                  <a:schemeClr val="dk1">
+                    <a:alpha val="40000"/>
+                  </a:schemeClr>
+                </a:outerShdw>
+              </a:effectLst>
+              <a:latin typeface="Proxima Nova" charset="0"/>
+              <a:ea typeface="Proxima Nova" charset="0"/>
+              <a:cs typeface="Proxima Nova" charset="0"/>
+            </a:endParaRPr>
+          </a:p>
+        </p:txBody>
+      </p:sp>
+    </p:spTree>
+    <p:extLst>
+      <p:ext uri="{BB962C8B-B14F-4D97-AF65-F5344CB8AC3E}">
+        <p14:creationId xmlns:p14="http://schemas.microsoft.com/office/powerpoint/2010/main" val="2467172699"/>
+      </p:ext>
+    </p:extLst>
+  </p:cSld>
+  <p:clrMapOvr>
+    <a:masterClrMapping/>
+  </p:clrMapOvr>
+  <mc:AlternateContent xmlns:mc="http://schemas.openxmlformats.org/markup-compatibility/2006" xmlns:p14="http://schemas.microsoft.com/office/powerpoint/2010/main">
+    <mc:Choice Requires="p14">
+      <p:transition p14:dur="300">
+        <p:fade/>
+      </p:transition>
+    </mc:Choice>
+    <mc:Fallback xmlns="">
+      <p:transition>
+        <p:fade/>
+      </p:transition>
+    </mc:Fallback>
+  </mc:AlternateContent>
+</p:sld>
+</file>
+
+<file path=ppt/slides/slide12.xml><?xml version="1.0" encoding="utf-8"?>
+<p:sld xmlns:a="http://schemas.openxmlformats.org/drawingml/2006/main" xmlns:r="http://schemas.openxmlformats.org/officeDocument/2006/relationships" xmlns:p="http://schemas.openxmlformats.org/presentationml/2006/main">
+  <p:cSld>
+    <p:spTree>
+      <p:nvGrpSpPr>
+        <p:cNvPr id="1" name=""/>
+        <p:cNvGrpSpPr/>
+        <p:nvPr/>
+      </p:nvGrpSpPr>
+      <p:grpSpPr>
+        <a:xfrm>
+          <a:off x="0" y="0"/>
+          <a:ext cx="0" cy="0"/>
+          <a:chOff x="0" y="0"/>
+          <a:chExt cx="0" cy="0"/>
+        </a:xfrm>
+      </p:grpSpPr>
+      <p:sp>
+        <p:nvSpPr>
+          <p:cNvPr id="2" name="Title 1">
+            <a:extLst>
+              <a:ext uri="{FF2B5EF4-FFF2-40B4-BE49-F238E27FC236}">
+                <a16:creationId xmlns:a16="http://schemas.microsoft.com/office/drawing/2014/main" id="{C4A5CD8F-0C98-AB47-A51C-836BF8F23CB4}"/>
+              </a:ext>
+            </a:extLst>
+          </p:cNvPr>
+          <p:cNvSpPr>
+            <a:spLocks noGrp="1"/>
+          </p:cNvSpPr>
+          <p:nvPr>
+            <p:ph type="title"/>
+          </p:nvPr>
+        </p:nvSpPr>
+        <p:spPr>
+          <a:xfrm>
+            <a:off x="628076" y="448059"/>
+            <a:ext cx="6788724" cy="1010479"/>
+          </a:xfrm>
+        </p:spPr>
+        <p:txBody>
+          <a:bodyPr/>
+          <a:lstStyle/>
+          <a:p>
+            <a:r>
+              <a:rPr lang="en-US" dirty="0"/>
+              <a:t>Step 2:  Doubles?</a:t>
+            </a:r>
+          </a:p>
+        </p:txBody>
+      </p:sp>
+      <p:sp>
+        <p:nvSpPr>
+          <p:cNvPr id="3" name="Text Placeholder 2">
+            <a:extLst>
+              <a:ext uri="{FF2B5EF4-FFF2-40B4-BE49-F238E27FC236}">
+                <a16:creationId xmlns:a16="http://schemas.microsoft.com/office/drawing/2014/main" id="{2DE660BE-EEE9-6D45-A230-4F3B0C80100A}"/>
+              </a:ext>
+            </a:extLst>
+          </p:cNvPr>
+          <p:cNvSpPr>
+            <a:spLocks noGrp="1"/>
+          </p:cNvSpPr>
+          <p:nvPr>
+            <p:ph type="body" sz="quarter" idx="10"/>
+          </p:nvPr>
+        </p:nvSpPr>
+        <p:spPr>
+          <a:xfrm>
+            <a:off x="628075" y="1776682"/>
+            <a:ext cx="8109525" cy="3688382"/>
+          </a:xfrm>
+        </p:spPr>
+        <p:txBody>
+          <a:bodyPr/>
+          <a:lstStyle/>
+          <a:p>
+            <a:r>
+              <a:rPr lang="en-US" dirty="0"/>
+              <a:t>Can you convert each line to a double?</a:t>
+            </a:r>
+          </a:p>
+          <a:p>
+            <a:pPr lvl="1"/>
+            <a:r>
+              <a:rPr lang="en-US" dirty="0"/>
+              <a:t>Just do that! </a:t>
+            </a:r>
+          </a:p>
+          <a:p>
+            <a:pPr lvl="1"/>
+            <a:r>
+              <a:rPr lang="en-US" dirty="0"/>
+              <a:t>Maybe add the values together – just to make sure</a:t>
+            </a:r>
+          </a:p>
+          <a:p>
+            <a:pPr lvl="1"/>
+            <a:endParaRPr lang="en-US" dirty="0"/>
+          </a:p>
+          <a:p>
+            <a:r>
+              <a:rPr lang="en-US" dirty="0"/>
+              <a:t>Step 2.5 </a:t>
+            </a:r>
+          </a:p>
+          <a:p>
+            <a:pPr lvl="1"/>
+            <a:r>
+              <a:rPr lang="en-US" dirty="0"/>
+              <a:t>Create a very large double Array (100 positions  or so)</a:t>
+            </a:r>
+          </a:p>
+          <a:p>
+            <a:pPr lvl="1"/>
+            <a:r>
+              <a:rPr lang="en-US" dirty="0"/>
+              <a:t>Create a  line counter</a:t>
+            </a:r>
+          </a:p>
+          <a:p>
+            <a:pPr lvl="1"/>
+            <a:r>
+              <a:rPr lang="en-US" dirty="0"/>
+              <a:t>Store Doubles into the double Array</a:t>
+            </a:r>
+          </a:p>
+          <a:p>
+            <a:endParaRPr lang="en-US" dirty="0"/>
+          </a:p>
+        </p:txBody>
+      </p:sp>
+      <p:sp>
+        <p:nvSpPr>
+          <p:cNvPr id="4" name="TextBox 3">
+            <a:extLst>
+              <a:ext uri="{FF2B5EF4-FFF2-40B4-BE49-F238E27FC236}">
+                <a16:creationId xmlns:a16="http://schemas.microsoft.com/office/drawing/2014/main" id="{CD808EC3-5906-4B46-AA8E-ADC119CE978F}"/>
+              </a:ext>
+            </a:extLst>
+          </p:cNvPr>
+          <p:cNvSpPr txBox="1"/>
+          <p:nvPr/>
+        </p:nvSpPr>
+        <p:spPr>
+          <a:xfrm>
+            <a:off x="7676445" y="135099"/>
+            <a:ext cx="6009791" cy="1323439"/>
+          </a:xfrm>
+          <a:prstGeom prst="rect">
+            <a:avLst/>
+          </a:prstGeom>
+          <a:solidFill>
+            <a:schemeClr val="accent2"/>
+          </a:solidFill>
+        </p:spPr>
+        <p:txBody>
+          <a:bodyPr wrap="square">
+            <a:spAutoFit/>
+          </a:bodyPr>
+          <a:lstStyle/>
+          <a:p>
+            <a:pPr fontAlgn="base"/>
+            <a:r>
+              <a:rPr lang="en-US" b="1" dirty="0"/>
+              <a:t>What is my quest?</a:t>
+            </a:r>
+          </a:p>
+          <a:p>
+            <a:pPr fontAlgn="base"/>
+            <a:r>
+              <a:rPr lang="en-US" dirty="0"/>
+              <a:t>Write a method </a:t>
+            </a:r>
+            <a:r>
+              <a:rPr lang="en-US" dirty="0" err="1"/>
+              <a:t>fileReadingDouble</a:t>
+            </a:r>
+            <a:r>
+              <a:rPr lang="en-US" dirty="0"/>
+              <a:t>(String filename) that reads a file which contains double values and return an array with those values.</a:t>
+            </a:r>
+          </a:p>
+        </p:txBody>
+      </p:sp>
+      <p:sp>
+        <p:nvSpPr>
+          <p:cNvPr id="5" name="Snip Single Corner Rectangle 4">
+            <a:extLst>
+              <a:ext uri="{FF2B5EF4-FFF2-40B4-BE49-F238E27FC236}">
+                <a16:creationId xmlns:a16="http://schemas.microsoft.com/office/drawing/2014/main" id="{5A7440A3-EC29-B34E-BAF0-7FA72264C0C7}"/>
+              </a:ext>
+            </a:extLst>
+          </p:cNvPr>
+          <p:cNvSpPr/>
+          <p:nvPr/>
+        </p:nvSpPr>
+        <p:spPr>
+          <a:xfrm>
+            <a:off x="12440356" y="5440908"/>
+            <a:ext cx="1106311" cy="1761066"/>
+          </a:xfrm>
+          <a:prstGeom prst="snip1Rect">
+            <a:avLst/>
+          </a:prstGeom>
+          <a:noFill/>
+          <a:ln>
+            <a:solidFill>
+              <a:schemeClr val="accent2"/>
+            </a:solidFill>
+          </a:ln>
+          <a:effectLst/>
+        </p:spPr>
+        <p:style>
+          <a:lnRef idx="1">
+            <a:schemeClr val="accent1"/>
+          </a:lnRef>
+          <a:fillRef idx="3">
+            <a:schemeClr val="accent1"/>
+          </a:fillRef>
+          <a:effectRef idx="2">
+            <a:schemeClr val="accent1"/>
+          </a:effectRef>
+          <a:fontRef idx="minor">
+            <a:schemeClr val="lt1"/>
+          </a:fontRef>
+        </p:style>
+        <p:txBody>
+          <a:bodyPr lIns="274320" tIns="182880" rIns="274320" bIns="182880" rtlCol="0" anchor="ctr"/>
+          <a:lstStyle/>
+          <a:p>
+            <a:pPr algn="ctr"/>
+            <a:r>
+              <a:rPr lang="en-US" dirty="0">
+                <a:ln w="0"/>
+                <a:solidFill>
+                  <a:schemeClr val="tx1"/>
+                </a:solidFill>
+                <a:effectLst>
+                  <a:outerShdw blurRad="38100" dist="19050" dir="2700000" algn="tl" rotWithShape="0">
+                    <a:schemeClr val="dk1">
+                      <a:alpha val="40000"/>
+                    </a:schemeClr>
+                  </a:outerShdw>
+                </a:effectLst>
+              </a:rPr>
+              <a:t>1.0</a:t>
+            </a:r>
+            <a:br>
+              <a:rPr lang="en-US" dirty="0">
+                <a:ln w="0"/>
+                <a:solidFill>
+                  <a:schemeClr val="tx1"/>
+                </a:solidFill>
+                <a:effectLst>
+                  <a:outerShdw blurRad="38100" dist="19050" dir="2700000" algn="tl" rotWithShape="0">
+                    <a:schemeClr val="dk1">
+                      <a:alpha val="40000"/>
+                    </a:schemeClr>
+                  </a:outerShdw>
+                </a:effectLst>
+              </a:rPr>
+            </a:br>
+            <a:r>
+              <a:rPr lang="en-US" dirty="0">
+                <a:ln w="0"/>
+                <a:solidFill>
+                  <a:schemeClr val="tx1"/>
+                </a:solidFill>
+                <a:effectLst>
+                  <a:outerShdw blurRad="38100" dist="19050" dir="2700000" algn="tl" rotWithShape="0">
+                    <a:schemeClr val="dk1">
+                      <a:alpha val="40000"/>
+                    </a:schemeClr>
+                  </a:outerShdw>
+                </a:effectLst>
+              </a:rPr>
+              <a:t>2.5</a:t>
+            </a:r>
+            <a:br>
+              <a:rPr lang="en-US" dirty="0">
+                <a:ln w="0"/>
+                <a:solidFill>
+                  <a:schemeClr val="tx1"/>
+                </a:solidFill>
+                <a:effectLst>
+                  <a:outerShdw blurRad="38100" dist="19050" dir="2700000" algn="tl" rotWithShape="0">
+                    <a:schemeClr val="dk1">
+                      <a:alpha val="40000"/>
+                    </a:schemeClr>
+                  </a:outerShdw>
+                </a:effectLst>
+              </a:rPr>
+            </a:br>
+            <a:r>
+              <a:rPr lang="en-US" dirty="0">
+                <a:ln w="0"/>
+                <a:solidFill>
+                  <a:schemeClr val="tx1"/>
+                </a:solidFill>
+                <a:effectLst>
+                  <a:outerShdw blurRad="38100" dist="19050" dir="2700000" algn="tl" rotWithShape="0">
+                    <a:schemeClr val="dk1">
+                      <a:alpha val="40000"/>
+                    </a:schemeClr>
+                  </a:outerShdw>
+                </a:effectLst>
+              </a:rPr>
+              <a:t>3.0</a:t>
+            </a:r>
+            <a:br>
+              <a:rPr lang="en-US" dirty="0">
+                <a:ln w="0"/>
+                <a:solidFill>
+                  <a:schemeClr val="tx1"/>
+                </a:solidFill>
+                <a:effectLst>
+                  <a:outerShdw blurRad="38100" dist="19050" dir="2700000" algn="tl" rotWithShape="0">
+                    <a:schemeClr val="dk1">
+                      <a:alpha val="40000"/>
+                    </a:schemeClr>
+                  </a:outerShdw>
+                </a:effectLst>
+              </a:rPr>
+            </a:br>
+            <a:r>
+              <a:rPr lang="en-US" dirty="0">
+                <a:ln w="0"/>
+                <a:solidFill>
+                  <a:schemeClr val="tx1"/>
+                </a:solidFill>
+                <a:effectLst>
+                  <a:outerShdw blurRad="38100" dist="19050" dir="2700000" algn="tl" rotWithShape="0">
+                    <a:schemeClr val="dk1">
+                      <a:alpha val="40000"/>
+                    </a:schemeClr>
+                  </a:outerShdw>
+                </a:effectLst>
+              </a:rPr>
+              <a:t>4.5</a:t>
+            </a:r>
+            <a:br>
+              <a:rPr lang="en-US" dirty="0">
+                <a:ln w="0"/>
+                <a:solidFill>
+                  <a:schemeClr val="tx1"/>
+                </a:solidFill>
+                <a:effectLst>
+                  <a:outerShdw blurRad="38100" dist="19050" dir="2700000" algn="tl" rotWithShape="0">
+                    <a:schemeClr val="dk1">
+                      <a:alpha val="40000"/>
+                    </a:schemeClr>
+                  </a:outerShdw>
+                </a:effectLst>
+              </a:rPr>
+            </a:br>
+            <a:r>
+              <a:rPr lang="en-US" dirty="0">
+                <a:ln w="0"/>
+                <a:solidFill>
+                  <a:schemeClr val="tx1"/>
+                </a:solidFill>
+                <a:effectLst>
+                  <a:outerShdw blurRad="38100" dist="19050" dir="2700000" algn="tl" rotWithShape="0">
+                    <a:schemeClr val="dk1">
+                      <a:alpha val="40000"/>
+                    </a:schemeClr>
+                  </a:outerShdw>
+                </a:effectLst>
+              </a:rPr>
+              <a:t>5.0</a:t>
+            </a:r>
+            <a:endParaRPr lang="en-US" dirty="0">
+              <a:ln w="0"/>
+              <a:solidFill>
+                <a:schemeClr val="tx1"/>
+              </a:solidFill>
+              <a:effectLst>
+                <a:outerShdw blurRad="38100" dist="19050" dir="2700000" algn="tl" rotWithShape="0">
+                  <a:schemeClr val="dk1">
+                    <a:alpha val="40000"/>
+                  </a:schemeClr>
+                </a:outerShdw>
+              </a:effectLst>
+              <a:latin typeface="Proxima Nova" charset="0"/>
+              <a:ea typeface="Proxima Nova" charset="0"/>
+              <a:cs typeface="Proxima Nova" charset="0"/>
+            </a:endParaRPr>
+          </a:p>
+        </p:txBody>
+      </p:sp>
+    </p:spTree>
+    <p:extLst>
+      <p:ext uri="{BB962C8B-B14F-4D97-AF65-F5344CB8AC3E}">
+        <p14:creationId xmlns:p14="http://schemas.microsoft.com/office/powerpoint/2010/main" val="1439851429"/>
+      </p:ext>
+    </p:extLst>
+  </p:cSld>
+  <p:clrMapOvr>
+    <a:masterClrMapping/>
+  </p:clrMapOvr>
+  <mc:AlternateContent xmlns:mc="http://schemas.openxmlformats.org/markup-compatibility/2006" xmlns:p14="http://schemas.microsoft.com/office/powerpoint/2010/main">
+    <mc:Choice Requires="p14">
+      <p:transition p14:dur="300">
+        <p:fade/>
+      </p:transition>
+    </mc:Choice>
+    <mc:Fallback xmlns="">
+      <p:transition>
+        <p:fade/>
+      </p:transition>
+    </mc:Fallback>
+  </mc:AlternateContent>
+</p:sld>
+</file>
+
+<file path=ppt/slides/slide13.xml><?xml version="1.0" encoding="utf-8"?>
+<p:sld xmlns:a="http://schemas.openxmlformats.org/drawingml/2006/main" xmlns:r="http://schemas.openxmlformats.org/officeDocument/2006/relationships" xmlns:p="http://schemas.openxmlformats.org/presentationml/2006/main">
+  <p:cSld>
+    <p:spTree>
+      <p:nvGrpSpPr>
+        <p:cNvPr id="1" name=""/>
+        <p:cNvGrpSpPr/>
+        <p:nvPr/>
+      </p:nvGrpSpPr>
+      <p:grpSpPr>
+        <a:xfrm>
+          <a:off x="0" y="0"/>
+          <a:ext cx="0" cy="0"/>
+          <a:chOff x="0" y="0"/>
+          <a:chExt cx="0" cy="0"/>
+        </a:xfrm>
+      </p:grpSpPr>
+      <p:sp>
+        <p:nvSpPr>
+          <p:cNvPr id="2" name="Title 1">
+            <a:extLst>
+              <a:ext uri="{FF2B5EF4-FFF2-40B4-BE49-F238E27FC236}">
+                <a16:creationId xmlns:a16="http://schemas.microsoft.com/office/drawing/2014/main" id="{4196CB0D-96B3-E84D-84C7-26706631265E}"/>
+              </a:ext>
+            </a:extLst>
+          </p:cNvPr>
+          <p:cNvSpPr>
+            <a:spLocks noGrp="1"/>
+          </p:cNvSpPr>
+          <p:nvPr>
+            <p:ph type="title"/>
+          </p:nvPr>
+        </p:nvSpPr>
+        <p:spPr>
+          <a:xfrm>
+            <a:off x="628076" y="448060"/>
+            <a:ext cx="5908191" cy="1010478"/>
+          </a:xfrm>
+        </p:spPr>
+        <p:txBody>
+          <a:bodyPr/>
+          <a:lstStyle/>
+          <a:p>
+            <a:r>
+              <a:rPr lang="en-US" dirty="0"/>
+              <a:t>Step 3: Fix double[]</a:t>
+            </a:r>
+          </a:p>
+        </p:txBody>
+      </p:sp>
+      <p:sp>
+        <p:nvSpPr>
+          <p:cNvPr id="3" name="Text Placeholder 2">
+            <a:extLst>
+              <a:ext uri="{FF2B5EF4-FFF2-40B4-BE49-F238E27FC236}">
+                <a16:creationId xmlns:a16="http://schemas.microsoft.com/office/drawing/2014/main" id="{0E1B8011-0E90-1847-BC75-4995FCE052FD}"/>
+              </a:ext>
+            </a:extLst>
+          </p:cNvPr>
+          <p:cNvSpPr>
+            <a:spLocks noGrp="1"/>
+          </p:cNvSpPr>
+          <p:nvPr>
+            <p:ph type="body" sz="quarter" idx="10"/>
+          </p:nvPr>
+        </p:nvSpPr>
+        <p:spPr>
+          <a:xfrm>
+            <a:off x="628075" y="1776683"/>
+            <a:ext cx="12561453" cy="3057440"/>
+          </a:xfrm>
+        </p:spPr>
+        <p:txBody>
+          <a:bodyPr/>
+          <a:lstStyle/>
+          <a:p>
+            <a:r>
+              <a:rPr lang="en-US" dirty="0"/>
+              <a:t>The array  is larger than we need</a:t>
+            </a:r>
+          </a:p>
+          <a:p>
+            <a:pPr lvl="1"/>
+            <a:r>
+              <a:rPr lang="en-US" dirty="0"/>
+              <a:t>But we have the total values (line count)</a:t>
+            </a:r>
+          </a:p>
+          <a:p>
+            <a:pPr lvl="1"/>
+            <a:r>
+              <a:rPr lang="en-US" dirty="0"/>
+              <a:t>And we have the values</a:t>
+            </a:r>
+          </a:p>
+          <a:p>
+            <a:r>
+              <a:rPr lang="en-US" dirty="0"/>
+              <a:t>Create another method that takes in the double Array, and the </a:t>
+            </a:r>
+            <a:r>
+              <a:rPr lang="en-US" dirty="0" err="1"/>
+              <a:t>linecount</a:t>
+            </a:r>
+            <a:endParaRPr lang="en-US" dirty="0"/>
+          </a:p>
+          <a:p>
+            <a:pPr lvl="1"/>
+            <a:r>
+              <a:rPr lang="en-US" dirty="0"/>
+              <a:t>Builds a  smaller array, storing the values into a double[] array of  the correct size</a:t>
+            </a:r>
+          </a:p>
+          <a:p>
+            <a:r>
+              <a:rPr lang="en-US" dirty="0"/>
+              <a:t>return the new array</a:t>
+            </a:r>
+          </a:p>
+          <a:p>
+            <a:pPr lvl="1"/>
+            <a:r>
+              <a:rPr lang="en-US" dirty="0"/>
+              <a:t>and then return again out of the primary method</a:t>
+            </a:r>
+          </a:p>
+        </p:txBody>
+      </p:sp>
+      <p:sp>
+        <p:nvSpPr>
+          <p:cNvPr id="4" name="TextBox 3">
+            <a:extLst>
+              <a:ext uri="{FF2B5EF4-FFF2-40B4-BE49-F238E27FC236}">
+                <a16:creationId xmlns:a16="http://schemas.microsoft.com/office/drawing/2014/main" id="{F5CEA9A1-B81B-9B46-806E-53B54CC76911}"/>
+              </a:ext>
+            </a:extLst>
+          </p:cNvPr>
+          <p:cNvSpPr txBox="1"/>
+          <p:nvPr/>
+        </p:nvSpPr>
+        <p:spPr>
+          <a:xfrm>
+            <a:off x="7676445" y="135099"/>
+            <a:ext cx="6009791" cy="1323439"/>
+          </a:xfrm>
+          <a:prstGeom prst="rect">
+            <a:avLst/>
+          </a:prstGeom>
+          <a:solidFill>
+            <a:schemeClr val="accent2"/>
+          </a:solidFill>
+        </p:spPr>
+        <p:txBody>
+          <a:bodyPr wrap="square">
+            <a:spAutoFit/>
+          </a:bodyPr>
+          <a:lstStyle/>
+          <a:p>
+            <a:pPr fontAlgn="base"/>
+            <a:r>
+              <a:rPr lang="en-US" b="1" dirty="0"/>
+              <a:t>What is my quest?</a:t>
+            </a:r>
+          </a:p>
+          <a:p>
+            <a:pPr fontAlgn="base"/>
+            <a:r>
+              <a:rPr lang="en-US" dirty="0"/>
+              <a:t>Write a method </a:t>
+            </a:r>
+            <a:r>
+              <a:rPr lang="en-US" dirty="0" err="1"/>
+              <a:t>fileReadingDouble</a:t>
+            </a:r>
+            <a:r>
+              <a:rPr lang="en-US" dirty="0"/>
+              <a:t>(String filename) that reads a file which contains double values and return an array with those values.</a:t>
+            </a:r>
+          </a:p>
+        </p:txBody>
+      </p:sp>
+      <p:sp>
+        <p:nvSpPr>
+          <p:cNvPr id="5" name="Snip Single Corner Rectangle 4">
+            <a:extLst>
+              <a:ext uri="{FF2B5EF4-FFF2-40B4-BE49-F238E27FC236}">
+                <a16:creationId xmlns:a16="http://schemas.microsoft.com/office/drawing/2014/main" id="{27177766-6C48-6A48-99CD-35B7155A3906}"/>
+              </a:ext>
+            </a:extLst>
+          </p:cNvPr>
+          <p:cNvSpPr/>
+          <p:nvPr/>
+        </p:nvSpPr>
+        <p:spPr>
+          <a:xfrm>
+            <a:off x="12440356" y="5440908"/>
+            <a:ext cx="1106311" cy="1761066"/>
+          </a:xfrm>
+          <a:prstGeom prst="snip1Rect">
+            <a:avLst/>
+          </a:prstGeom>
+          <a:noFill/>
+          <a:ln>
+            <a:solidFill>
+              <a:schemeClr val="accent2"/>
+            </a:solidFill>
+          </a:ln>
+          <a:effectLst/>
+        </p:spPr>
+        <p:style>
+          <a:lnRef idx="1">
+            <a:schemeClr val="accent1"/>
+          </a:lnRef>
+          <a:fillRef idx="3">
+            <a:schemeClr val="accent1"/>
+          </a:fillRef>
+          <a:effectRef idx="2">
+            <a:schemeClr val="accent1"/>
+          </a:effectRef>
+          <a:fontRef idx="minor">
+            <a:schemeClr val="lt1"/>
+          </a:fontRef>
+        </p:style>
+        <p:txBody>
+          <a:bodyPr lIns="274320" tIns="182880" rIns="274320" bIns="182880" rtlCol="0" anchor="ctr"/>
+          <a:lstStyle/>
+          <a:p>
+            <a:pPr algn="ctr"/>
+            <a:r>
+              <a:rPr lang="en-US" dirty="0">
+                <a:ln w="0"/>
+                <a:solidFill>
+                  <a:schemeClr val="tx1"/>
+                </a:solidFill>
+                <a:effectLst>
+                  <a:outerShdw blurRad="38100" dist="19050" dir="2700000" algn="tl" rotWithShape="0">
+                    <a:schemeClr val="dk1">
+                      <a:alpha val="40000"/>
+                    </a:schemeClr>
+                  </a:outerShdw>
+                </a:effectLst>
+              </a:rPr>
+              <a:t>1.0</a:t>
+            </a:r>
+            <a:br>
+              <a:rPr lang="en-US" dirty="0">
+                <a:ln w="0"/>
+                <a:solidFill>
+                  <a:schemeClr val="tx1"/>
+                </a:solidFill>
+                <a:effectLst>
+                  <a:outerShdw blurRad="38100" dist="19050" dir="2700000" algn="tl" rotWithShape="0">
+                    <a:schemeClr val="dk1">
+                      <a:alpha val="40000"/>
+                    </a:schemeClr>
+                  </a:outerShdw>
+                </a:effectLst>
+              </a:rPr>
+            </a:br>
+            <a:r>
+              <a:rPr lang="en-US" dirty="0">
+                <a:ln w="0"/>
+                <a:solidFill>
+                  <a:schemeClr val="tx1"/>
+                </a:solidFill>
+                <a:effectLst>
+                  <a:outerShdw blurRad="38100" dist="19050" dir="2700000" algn="tl" rotWithShape="0">
+                    <a:schemeClr val="dk1">
+                      <a:alpha val="40000"/>
+                    </a:schemeClr>
+                  </a:outerShdw>
+                </a:effectLst>
+              </a:rPr>
+              <a:t>2.5</a:t>
+            </a:r>
+            <a:br>
+              <a:rPr lang="en-US" dirty="0">
+                <a:ln w="0"/>
+                <a:solidFill>
+                  <a:schemeClr val="tx1"/>
+                </a:solidFill>
+                <a:effectLst>
+                  <a:outerShdw blurRad="38100" dist="19050" dir="2700000" algn="tl" rotWithShape="0">
+                    <a:schemeClr val="dk1">
+                      <a:alpha val="40000"/>
+                    </a:schemeClr>
+                  </a:outerShdw>
+                </a:effectLst>
+              </a:rPr>
+            </a:br>
+            <a:r>
+              <a:rPr lang="en-US" dirty="0">
+                <a:ln w="0"/>
+                <a:solidFill>
+                  <a:schemeClr val="tx1"/>
+                </a:solidFill>
+                <a:effectLst>
+                  <a:outerShdw blurRad="38100" dist="19050" dir="2700000" algn="tl" rotWithShape="0">
+                    <a:schemeClr val="dk1">
+                      <a:alpha val="40000"/>
+                    </a:schemeClr>
+                  </a:outerShdw>
+                </a:effectLst>
+              </a:rPr>
+              <a:t>3.0</a:t>
+            </a:r>
+            <a:br>
+              <a:rPr lang="en-US" dirty="0">
+                <a:ln w="0"/>
+                <a:solidFill>
+                  <a:schemeClr val="tx1"/>
+                </a:solidFill>
+                <a:effectLst>
+                  <a:outerShdw blurRad="38100" dist="19050" dir="2700000" algn="tl" rotWithShape="0">
+                    <a:schemeClr val="dk1">
+                      <a:alpha val="40000"/>
+                    </a:schemeClr>
+                  </a:outerShdw>
+                </a:effectLst>
+              </a:rPr>
+            </a:br>
+            <a:r>
+              <a:rPr lang="en-US" dirty="0">
+                <a:ln w="0"/>
+                <a:solidFill>
+                  <a:schemeClr val="tx1"/>
+                </a:solidFill>
+                <a:effectLst>
+                  <a:outerShdw blurRad="38100" dist="19050" dir="2700000" algn="tl" rotWithShape="0">
+                    <a:schemeClr val="dk1">
+                      <a:alpha val="40000"/>
+                    </a:schemeClr>
+                  </a:outerShdw>
+                </a:effectLst>
+              </a:rPr>
+              <a:t>4.5</a:t>
+            </a:r>
+            <a:br>
+              <a:rPr lang="en-US" dirty="0">
+                <a:ln w="0"/>
+                <a:solidFill>
+                  <a:schemeClr val="tx1"/>
+                </a:solidFill>
+                <a:effectLst>
+                  <a:outerShdw blurRad="38100" dist="19050" dir="2700000" algn="tl" rotWithShape="0">
+                    <a:schemeClr val="dk1">
+                      <a:alpha val="40000"/>
+                    </a:schemeClr>
+                  </a:outerShdw>
+                </a:effectLst>
+              </a:rPr>
+            </a:br>
+            <a:r>
+              <a:rPr lang="en-US" dirty="0">
+                <a:ln w="0"/>
+                <a:solidFill>
+                  <a:schemeClr val="tx1"/>
+                </a:solidFill>
+                <a:effectLst>
+                  <a:outerShdw blurRad="38100" dist="19050" dir="2700000" algn="tl" rotWithShape="0">
+                    <a:schemeClr val="dk1">
+                      <a:alpha val="40000"/>
+                    </a:schemeClr>
+                  </a:outerShdw>
+                </a:effectLst>
+              </a:rPr>
+              <a:t>5.0</a:t>
+            </a:r>
+            <a:endParaRPr lang="en-US" dirty="0">
+              <a:ln w="0"/>
+              <a:solidFill>
+                <a:schemeClr val="tx1"/>
+              </a:solidFill>
+              <a:effectLst>
+                <a:outerShdw blurRad="38100" dist="19050" dir="2700000" algn="tl" rotWithShape="0">
+                  <a:schemeClr val="dk1">
+                    <a:alpha val="40000"/>
+                  </a:schemeClr>
+                </a:outerShdw>
+              </a:effectLst>
+              <a:latin typeface="Proxima Nova" charset="0"/>
+              <a:ea typeface="Proxima Nova" charset="0"/>
+              <a:cs typeface="Proxima Nova" charset="0"/>
+            </a:endParaRPr>
+          </a:p>
+        </p:txBody>
+      </p:sp>
+    </p:spTree>
+    <p:extLst>
+      <p:ext uri="{BB962C8B-B14F-4D97-AF65-F5344CB8AC3E}">
+        <p14:creationId xmlns:p14="http://schemas.microsoft.com/office/powerpoint/2010/main" val="2296537038"/>
       </p:ext>
     </p:extLst>
   </p:cSld>

</xml_diff>